<commit_message>
changes from oct 9, 2019: final inputs before submitting to Q.C.
</commit_message>
<xml_diff>
--- a/writing/Figures/Figures.pptx
+++ b/writing/Figures/Figures.pptx
@@ -11,8 +11,8 @@
     <p:sldId id="256" r:id="rId2"/>
     <p:sldId id="257" r:id="rId3"/>
     <p:sldId id="258" r:id="rId4"/>
-    <p:sldId id="260" r:id="rId5"/>
-    <p:sldId id="259" r:id="rId6"/>
+    <p:sldId id="259" r:id="rId5"/>
+    <p:sldId id="260" r:id="rId6"/>
   </p:sldIdLst>
   <p:sldSz cx="12192000" cy="6858000"/>
   <p:notesSz cx="6858000" cy="9144000"/>
@@ -201,7 +201,7 @@
           <a:p>
             <a:fld id="{95494D6B-3D71-4CB1-96DC-393CCB75F75F}" type="datetimeFigureOut">
               <a:rPr lang="en-CA" smtClean="0"/>
-              <a:t>2019-08-06</a:t>
+              <a:t>2019-10-08</a:t>
             </a:fld>
             <a:endParaRPr lang="en-CA"/>
           </a:p>
@@ -515,23 +515,7 @@
           <a:p>
             <a:r>
               <a:rPr lang="en-CA" dirty="0"/>
-              <a:t>Figure 4. Illustrations of vectors. (A) On the x and y axis are the unit vectors </a:t>
-            </a:r>
-            <a:r>
-              <a:rPr lang="en-CA" dirty="0" err="1"/>
-              <a:t>i</a:t>
-            </a:r>
-            <a:r>
-              <a:rPr lang="en-CA" dirty="0"/>
-              <a:t> and j, respectively, of length 1. The point P = (2,1) can be rewritten as a position vector r, that is made of two </a:t>
-            </a:r>
-            <a:r>
-              <a:rPr lang="en-CA" dirty="0" err="1"/>
-              <a:t>i</a:t>
-            </a:r>
-            <a:r>
-              <a:rPr lang="en-CA" dirty="0"/>
-              <a:t> unit vectors and one j unit vector, r = 2i + j. The length of r is ||r|| = sqrt 2^2+1^2.  </a:t>
+              <a:t>Figure 3</a:t>
             </a:r>
           </a:p>
         </p:txBody>
@@ -554,6 +538,109 @@
             <a:fld id="{BBCBBB54-D156-49F5-A63F-13BE6089D128}" type="slidenum">
               <a:rPr lang="en-CA" smtClean="0"/>
               <a:t>4</a:t>
+            </a:fld>
+            <a:endParaRPr lang="en-CA"/>
+          </a:p>
+        </p:txBody>
+      </p:sp>
+    </p:spTree>
+    <p:extLst>
+      <p:ext uri="{BB962C8B-B14F-4D97-AF65-F5344CB8AC3E}">
+        <p14:creationId xmlns:p14="http://schemas.microsoft.com/office/powerpoint/2010/main" val="3646160701"/>
+      </p:ext>
+    </p:extLst>
+  </p:cSld>
+  <p:clrMapOvr>
+    <a:masterClrMapping/>
+  </p:clrMapOvr>
+</p:notes>
+</file>
+
+<file path=ppt/notesSlides/notesSlide2.xml><?xml version="1.0" encoding="utf-8"?>
+<p:notes xmlns:a="http://schemas.openxmlformats.org/drawingml/2006/main" xmlns:r="http://schemas.openxmlformats.org/officeDocument/2006/relationships" xmlns:p="http://schemas.openxmlformats.org/presentationml/2006/main">
+  <p:cSld>
+    <p:spTree>
+      <p:nvGrpSpPr>
+        <p:cNvPr id="1" name=""/>
+        <p:cNvGrpSpPr/>
+        <p:nvPr/>
+      </p:nvGrpSpPr>
+      <p:grpSpPr>
+        <a:xfrm>
+          <a:off x="0" y="0"/>
+          <a:ext cx="0" cy="0"/>
+          <a:chOff x="0" y="0"/>
+          <a:chExt cx="0" cy="0"/>
+        </a:xfrm>
+      </p:grpSpPr>
+      <p:sp>
+        <p:nvSpPr>
+          <p:cNvPr id="2" name="Slide Image Placeholder 1"/>
+          <p:cNvSpPr>
+            <a:spLocks noGrp="1" noRot="1" noChangeAspect="1"/>
+          </p:cNvSpPr>
+          <p:nvPr>
+            <p:ph type="sldImg"/>
+          </p:nvPr>
+        </p:nvSpPr>
+        <p:spPr/>
+      </p:sp>
+      <p:sp>
+        <p:nvSpPr>
+          <p:cNvPr id="3" name="Notes Placeholder 2"/>
+          <p:cNvSpPr>
+            <a:spLocks noGrp="1"/>
+          </p:cNvSpPr>
+          <p:nvPr>
+            <p:ph type="body" idx="1"/>
+          </p:nvPr>
+        </p:nvSpPr>
+        <p:spPr/>
+        <p:txBody>
+          <a:bodyPr/>
+          <a:lstStyle/>
+          <a:p>
+            <a:r>
+              <a:rPr lang="en-CA" dirty="0"/>
+              <a:t>Figure 4. Illustrations of vectors. Left: On the x and y axis are the unit vectors </a:t>
+            </a:r>
+            <a:r>
+              <a:rPr lang="en-CA" dirty="0" err="1"/>
+              <a:t>i</a:t>
+            </a:r>
+            <a:r>
+              <a:rPr lang="en-CA" dirty="0"/>
+              <a:t> and j, respectively, of length 1. The point P = (2,1) can be rewritten as a position vector r, that is made of two </a:t>
+            </a:r>
+            <a:r>
+              <a:rPr lang="en-CA" dirty="0" err="1"/>
+              <a:t>i</a:t>
+            </a:r>
+            <a:r>
+              <a:rPr lang="en-CA" dirty="0"/>
+              <a:t> unit vectors and one j unit vector, r = 2i + j. The length of r is ||r|| = sqrt 2^2+1^2.  Right: A vector valued function describing a curve, parameterized by arc length.</a:t>
+            </a:r>
+          </a:p>
+        </p:txBody>
+      </p:sp>
+      <p:sp>
+        <p:nvSpPr>
+          <p:cNvPr id="4" name="Slide Number Placeholder 3"/>
+          <p:cNvSpPr>
+            <a:spLocks noGrp="1"/>
+          </p:cNvSpPr>
+          <p:nvPr>
+            <p:ph type="sldNum" sz="quarter" idx="5"/>
+          </p:nvPr>
+        </p:nvSpPr>
+        <p:spPr/>
+        <p:txBody>
+          <a:bodyPr/>
+          <a:lstStyle/>
+          <a:p>
+            <a:fld id="{BBCBBB54-D156-49F5-A63F-13BE6089D128}" type="slidenum">
+              <a:rPr lang="en-CA" smtClean="0"/>
+              <a:t>5</a:t>
             </a:fld>
             <a:endParaRPr lang="en-CA"/>
           </a:p>
@@ -721,7 +808,7 @@
           <a:p>
             <a:fld id="{6D4DA5E1-B1AC-4044-B260-6EA3A1AE9385}" type="datetimeFigureOut">
               <a:rPr lang="en-CA" smtClean="0"/>
-              <a:t>2019-08-06</a:t>
+              <a:t>2019-10-08</a:t>
             </a:fld>
             <a:endParaRPr lang="en-CA"/>
           </a:p>
@@ -921,7 +1008,7 @@
           <a:p>
             <a:fld id="{6D4DA5E1-B1AC-4044-B260-6EA3A1AE9385}" type="datetimeFigureOut">
               <a:rPr lang="en-CA" smtClean="0"/>
-              <a:t>2019-08-06</a:t>
+              <a:t>2019-10-08</a:t>
             </a:fld>
             <a:endParaRPr lang="en-CA"/>
           </a:p>
@@ -1131,7 +1218,7 @@
           <a:p>
             <a:fld id="{6D4DA5E1-B1AC-4044-B260-6EA3A1AE9385}" type="datetimeFigureOut">
               <a:rPr lang="en-CA" smtClean="0"/>
-              <a:t>2019-08-06</a:t>
+              <a:t>2019-10-08</a:t>
             </a:fld>
             <a:endParaRPr lang="en-CA"/>
           </a:p>
@@ -1331,7 +1418,7 @@
           <a:p>
             <a:fld id="{6D4DA5E1-B1AC-4044-B260-6EA3A1AE9385}" type="datetimeFigureOut">
               <a:rPr lang="en-CA" smtClean="0"/>
-              <a:t>2019-08-06</a:t>
+              <a:t>2019-10-08</a:t>
             </a:fld>
             <a:endParaRPr lang="en-CA"/>
           </a:p>
@@ -1607,7 +1694,7 @@
           <a:p>
             <a:fld id="{6D4DA5E1-B1AC-4044-B260-6EA3A1AE9385}" type="datetimeFigureOut">
               <a:rPr lang="en-CA" smtClean="0"/>
-              <a:t>2019-08-06</a:t>
+              <a:t>2019-10-08</a:t>
             </a:fld>
             <a:endParaRPr lang="en-CA"/>
           </a:p>
@@ -1875,7 +1962,7 @@
           <a:p>
             <a:fld id="{6D4DA5E1-B1AC-4044-B260-6EA3A1AE9385}" type="datetimeFigureOut">
               <a:rPr lang="en-CA" smtClean="0"/>
-              <a:t>2019-08-06</a:t>
+              <a:t>2019-10-08</a:t>
             </a:fld>
             <a:endParaRPr lang="en-CA"/>
           </a:p>
@@ -2290,7 +2377,7 @@
           <a:p>
             <a:fld id="{6D4DA5E1-B1AC-4044-B260-6EA3A1AE9385}" type="datetimeFigureOut">
               <a:rPr lang="en-CA" smtClean="0"/>
-              <a:t>2019-08-06</a:t>
+              <a:t>2019-10-08</a:t>
             </a:fld>
             <a:endParaRPr lang="en-CA"/>
           </a:p>
@@ -2432,7 +2519,7 @@
           <a:p>
             <a:fld id="{6D4DA5E1-B1AC-4044-B260-6EA3A1AE9385}" type="datetimeFigureOut">
               <a:rPr lang="en-CA" smtClean="0"/>
-              <a:t>2019-08-06</a:t>
+              <a:t>2019-10-08</a:t>
             </a:fld>
             <a:endParaRPr lang="en-CA"/>
           </a:p>
@@ -2545,7 +2632,7 @@
           <a:p>
             <a:fld id="{6D4DA5E1-B1AC-4044-B260-6EA3A1AE9385}" type="datetimeFigureOut">
               <a:rPr lang="en-CA" smtClean="0"/>
-              <a:t>2019-08-06</a:t>
+              <a:t>2019-10-08</a:t>
             </a:fld>
             <a:endParaRPr lang="en-CA"/>
           </a:p>
@@ -2858,7 +2945,7 @@
           <a:p>
             <a:fld id="{6D4DA5E1-B1AC-4044-B260-6EA3A1AE9385}" type="datetimeFigureOut">
               <a:rPr lang="en-CA" smtClean="0"/>
-              <a:t>2019-08-06</a:t>
+              <a:t>2019-10-08</a:t>
             </a:fld>
             <a:endParaRPr lang="en-CA"/>
           </a:p>
@@ -3147,7 +3234,7 @@
           <a:p>
             <a:fld id="{6D4DA5E1-B1AC-4044-B260-6EA3A1AE9385}" type="datetimeFigureOut">
               <a:rPr lang="en-CA" smtClean="0"/>
-              <a:t>2019-08-06</a:t>
+              <a:t>2019-10-08</a:t>
             </a:fld>
             <a:endParaRPr lang="en-CA"/>
           </a:p>
@@ -3390,7 +3477,7 @@
           <a:p>
             <a:fld id="{6D4DA5E1-B1AC-4044-B260-6EA3A1AE9385}" type="datetimeFigureOut">
               <a:rPr lang="en-CA" smtClean="0"/>
-              <a:t>2019-08-06</a:t>
+              <a:t>2019-10-08</a:t>
             </a:fld>
             <a:endParaRPr lang="en-CA"/>
           </a:p>
@@ -7413,7 +7500,7 @@
           <a:p>
             <a:r>
               <a:rPr lang="en-CA" dirty="0"/>
-              <a:t>Geometric morphometrics</a:t>
+              <a:t>Geometric morphometrics (figure 2)</a:t>
             </a:r>
           </a:p>
         </p:txBody>
@@ -7539,657 +7626,6 @@
 </file>
 
 <file path=ppt/slides/slide4.xml><?xml version="1.0" encoding="utf-8"?>
-<p:sld xmlns:a="http://schemas.openxmlformats.org/drawingml/2006/main" xmlns:r="http://schemas.openxmlformats.org/officeDocument/2006/relationships" xmlns:p="http://schemas.openxmlformats.org/presentationml/2006/main">
-  <p:cSld>
-    <p:spTree>
-      <p:nvGrpSpPr>
-        <p:cNvPr id="1" name=""/>
-        <p:cNvGrpSpPr/>
-        <p:nvPr/>
-      </p:nvGrpSpPr>
-      <p:grpSpPr>
-        <a:xfrm>
-          <a:off x="0" y="0"/>
-          <a:ext cx="0" cy="0"/>
-          <a:chOff x="0" y="0"/>
-          <a:chExt cx="0" cy="0"/>
-        </a:xfrm>
-      </p:grpSpPr>
-      <p:grpSp>
-        <p:nvGrpSpPr>
-          <p:cNvPr id="27" name="Group 26">
-            <a:extLst>
-              <a:ext uri="{FF2B5EF4-FFF2-40B4-BE49-F238E27FC236}">
-                <a16:creationId xmlns:a16="http://schemas.microsoft.com/office/drawing/2014/main" id="{4655A522-2B02-4D6C-B968-35BB7F51125C}"/>
-              </a:ext>
-            </a:extLst>
-          </p:cNvPr>
-          <p:cNvGrpSpPr/>
-          <p:nvPr/>
-        </p:nvGrpSpPr>
-        <p:grpSpPr>
-          <a:xfrm>
-            <a:off x="-78463" y="217714"/>
-            <a:ext cx="4124319" cy="4483489"/>
-            <a:chOff x="-78463" y="217714"/>
-            <a:chExt cx="4124319" cy="4483489"/>
-          </a:xfrm>
-        </p:grpSpPr>
-        <p:cxnSp>
-          <p:nvCxnSpPr>
-            <p:cNvPr id="5" name="Straight Connector 4">
-              <a:extLst>
-                <a:ext uri="{FF2B5EF4-FFF2-40B4-BE49-F238E27FC236}">
-                  <a16:creationId xmlns:a16="http://schemas.microsoft.com/office/drawing/2014/main" id="{670BA2F8-FB15-47C1-8E3E-4CCFC5152ACE}"/>
-                </a:ext>
-              </a:extLst>
-            </p:cNvPr>
-            <p:cNvCxnSpPr>
-              <a:cxnSpLocks/>
-            </p:cNvCxnSpPr>
-            <p:nvPr/>
-          </p:nvCxnSpPr>
-          <p:spPr>
-            <a:xfrm>
-              <a:off x="580572" y="580571"/>
-              <a:ext cx="0" cy="3505200"/>
-            </a:xfrm>
-            <a:prstGeom prst="line">
-              <a:avLst/>
-            </a:prstGeom>
-            <a:ln w="28575">
-              <a:solidFill>
-                <a:schemeClr val="tx1"/>
-              </a:solidFill>
-            </a:ln>
-          </p:spPr>
-          <p:style>
-            <a:lnRef idx="1">
-              <a:schemeClr val="accent1"/>
-            </a:lnRef>
-            <a:fillRef idx="0">
-              <a:schemeClr val="accent1"/>
-            </a:fillRef>
-            <a:effectRef idx="0">
-              <a:schemeClr val="accent1"/>
-            </a:effectRef>
-            <a:fontRef idx="minor">
-              <a:schemeClr val="tx1"/>
-            </a:fontRef>
-          </p:style>
-        </p:cxnSp>
-        <p:cxnSp>
-          <p:nvCxnSpPr>
-            <p:cNvPr id="7" name="Straight Connector 6">
-              <a:extLst>
-                <a:ext uri="{FF2B5EF4-FFF2-40B4-BE49-F238E27FC236}">
-                  <a16:creationId xmlns:a16="http://schemas.microsoft.com/office/drawing/2014/main" id="{59D83D63-A0EE-419C-AF88-6FF32E972F62}"/>
-                </a:ext>
-              </a:extLst>
-            </p:cNvPr>
-            <p:cNvCxnSpPr>
-              <a:cxnSpLocks/>
-            </p:cNvCxnSpPr>
-            <p:nvPr/>
-          </p:nvCxnSpPr>
-          <p:spPr>
-            <a:xfrm flipH="1">
-              <a:off x="413658" y="3926114"/>
-              <a:ext cx="3331028" cy="0"/>
-            </a:xfrm>
-            <a:prstGeom prst="line">
-              <a:avLst/>
-            </a:prstGeom>
-            <a:ln w="28575">
-              <a:solidFill>
-                <a:schemeClr val="tx1"/>
-              </a:solidFill>
-            </a:ln>
-          </p:spPr>
-          <p:style>
-            <a:lnRef idx="1">
-              <a:schemeClr val="accent1"/>
-            </a:lnRef>
-            <a:fillRef idx="0">
-              <a:schemeClr val="accent1"/>
-            </a:fillRef>
-            <a:effectRef idx="0">
-              <a:schemeClr val="accent1"/>
-            </a:effectRef>
-            <a:fontRef idx="minor">
-              <a:schemeClr val="tx1"/>
-            </a:fontRef>
-          </p:style>
-        </p:cxnSp>
-        <p:sp>
-          <p:nvSpPr>
-            <p:cNvPr id="10" name="TextBox 9">
-              <a:extLst>
-                <a:ext uri="{FF2B5EF4-FFF2-40B4-BE49-F238E27FC236}">
-                  <a16:creationId xmlns:a16="http://schemas.microsoft.com/office/drawing/2014/main" id="{0FD3D336-9BEA-4AAF-B579-D656585AABC0}"/>
-                </a:ext>
-              </a:extLst>
-            </p:cNvPr>
-            <p:cNvSpPr txBox="1"/>
-            <p:nvPr/>
-          </p:nvSpPr>
-          <p:spPr>
-            <a:xfrm>
-              <a:off x="413658" y="217714"/>
-              <a:ext cx="268512" cy="369332"/>
-            </a:xfrm>
-            <a:prstGeom prst="rect">
-              <a:avLst/>
-            </a:prstGeom>
-            <a:noFill/>
-          </p:spPr>
-          <p:txBody>
-            <a:bodyPr wrap="square" rtlCol="0">
-              <a:spAutoFit/>
-            </a:bodyPr>
-            <a:lstStyle/>
-            <a:p>
-              <a:r>
-                <a:rPr lang="en-CA" i="1" dirty="0"/>
-                <a:t>y</a:t>
-              </a:r>
-            </a:p>
-          </p:txBody>
-        </p:sp>
-        <p:sp>
-          <p:nvSpPr>
-            <p:cNvPr id="11" name="TextBox 10">
-              <a:extLst>
-                <a:ext uri="{FF2B5EF4-FFF2-40B4-BE49-F238E27FC236}">
-                  <a16:creationId xmlns:a16="http://schemas.microsoft.com/office/drawing/2014/main" id="{08376D9B-6F84-4C20-BDBA-E8F703C66DB0}"/>
-                </a:ext>
-              </a:extLst>
-            </p:cNvPr>
-            <p:cNvSpPr txBox="1"/>
-            <p:nvPr/>
-          </p:nvSpPr>
-          <p:spPr>
-            <a:xfrm>
-              <a:off x="3777344" y="3715655"/>
-              <a:ext cx="268512" cy="369332"/>
-            </a:xfrm>
-            <a:prstGeom prst="rect">
-              <a:avLst/>
-            </a:prstGeom>
-            <a:noFill/>
-          </p:spPr>
-          <p:txBody>
-            <a:bodyPr wrap="square" rtlCol="0">
-              <a:spAutoFit/>
-            </a:bodyPr>
-            <a:lstStyle/>
-            <a:p>
-              <a:r>
-                <a:rPr lang="en-CA" i="1" dirty="0"/>
-                <a:t>x</a:t>
-              </a:r>
-            </a:p>
-          </p:txBody>
-        </p:sp>
-        <p:cxnSp>
-          <p:nvCxnSpPr>
-            <p:cNvPr id="12" name="Straight Connector 11">
-              <a:extLst>
-                <a:ext uri="{FF2B5EF4-FFF2-40B4-BE49-F238E27FC236}">
-                  <a16:creationId xmlns:a16="http://schemas.microsoft.com/office/drawing/2014/main" id="{D83DE000-DAEF-4535-8A84-F8E8A5EBD6F4}"/>
-                </a:ext>
-              </a:extLst>
-            </p:cNvPr>
-            <p:cNvCxnSpPr>
-              <a:cxnSpLocks/>
-            </p:cNvCxnSpPr>
-            <p:nvPr/>
-          </p:nvCxnSpPr>
-          <p:spPr>
-            <a:xfrm flipH="1">
-              <a:off x="580572" y="3926114"/>
-              <a:ext cx="830941" cy="0"/>
-            </a:xfrm>
-            <a:prstGeom prst="line">
-              <a:avLst/>
-            </a:prstGeom>
-            <a:ln w="76200">
-              <a:solidFill>
-                <a:schemeClr val="tx1"/>
-              </a:solidFill>
-              <a:headEnd type="triangle" w="med" len="med"/>
-              <a:tailEnd type="none" w="med" len="med"/>
-            </a:ln>
-          </p:spPr>
-          <p:style>
-            <a:lnRef idx="1">
-              <a:schemeClr val="accent1"/>
-            </a:lnRef>
-            <a:fillRef idx="0">
-              <a:schemeClr val="accent1"/>
-            </a:fillRef>
-            <a:effectRef idx="0">
-              <a:schemeClr val="accent1"/>
-            </a:effectRef>
-            <a:fontRef idx="minor">
-              <a:schemeClr val="tx1"/>
-            </a:fontRef>
-          </p:style>
-        </p:cxnSp>
-        <p:cxnSp>
-          <p:nvCxnSpPr>
-            <p:cNvPr id="14" name="Straight Connector 13">
-              <a:extLst>
-                <a:ext uri="{FF2B5EF4-FFF2-40B4-BE49-F238E27FC236}">
-                  <a16:creationId xmlns:a16="http://schemas.microsoft.com/office/drawing/2014/main" id="{1A4D0860-2F96-4080-BF36-8C77EC73A973}"/>
-                </a:ext>
-              </a:extLst>
-            </p:cNvPr>
-            <p:cNvCxnSpPr>
-              <a:cxnSpLocks/>
-            </p:cNvCxnSpPr>
-            <p:nvPr/>
-          </p:nvCxnSpPr>
-          <p:spPr>
-            <a:xfrm>
-              <a:off x="580570" y="3090183"/>
-              <a:ext cx="1" cy="831600"/>
-            </a:xfrm>
-            <a:prstGeom prst="line">
-              <a:avLst/>
-            </a:prstGeom>
-            <a:ln w="76200">
-              <a:solidFill>
-                <a:schemeClr val="tx1"/>
-              </a:solidFill>
-              <a:headEnd type="triangle" w="med" len="med"/>
-              <a:tailEnd type="none" w="med" len="med"/>
-            </a:ln>
-          </p:spPr>
-          <p:style>
-            <a:lnRef idx="1">
-              <a:schemeClr val="accent1"/>
-            </a:lnRef>
-            <a:fillRef idx="0">
-              <a:schemeClr val="accent1"/>
-            </a:fillRef>
-            <a:effectRef idx="0">
-              <a:schemeClr val="accent1"/>
-            </a:effectRef>
-            <a:fontRef idx="minor">
-              <a:schemeClr val="tx1"/>
-            </a:fontRef>
-          </p:style>
-        </p:cxnSp>
-        <p:cxnSp>
-          <p:nvCxnSpPr>
-            <p:cNvPr id="16" name="Straight Connector 15">
-              <a:extLst>
-                <a:ext uri="{FF2B5EF4-FFF2-40B4-BE49-F238E27FC236}">
-                  <a16:creationId xmlns:a16="http://schemas.microsoft.com/office/drawing/2014/main" id="{0403D28C-1F68-49A6-9CC4-8C3EB00B70A3}"/>
-                </a:ext>
-              </a:extLst>
-            </p:cNvPr>
-            <p:cNvCxnSpPr>
-              <a:cxnSpLocks/>
-            </p:cNvCxnSpPr>
-            <p:nvPr/>
-          </p:nvCxnSpPr>
-          <p:spPr>
-            <a:xfrm flipH="1">
-              <a:off x="1411513" y="3921783"/>
-              <a:ext cx="830941" cy="0"/>
-            </a:xfrm>
-            <a:prstGeom prst="line">
-              <a:avLst/>
-            </a:prstGeom>
-            <a:ln w="76200">
-              <a:solidFill>
-                <a:schemeClr val="tx1"/>
-              </a:solidFill>
-              <a:headEnd type="triangle" w="med" len="med"/>
-              <a:tailEnd type="none" w="med" len="med"/>
-            </a:ln>
-          </p:spPr>
-          <p:style>
-            <a:lnRef idx="1">
-              <a:schemeClr val="accent1"/>
-            </a:lnRef>
-            <a:fillRef idx="0">
-              <a:schemeClr val="accent1"/>
-            </a:fillRef>
-            <a:effectRef idx="0">
-              <a:schemeClr val="accent1"/>
-            </a:effectRef>
-            <a:fontRef idx="minor">
-              <a:schemeClr val="tx1"/>
-            </a:fontRef>
-          </p:style>
-        </p:cxnSp>
-        <p:sp>
-          <p:nvSpPr>
-            <p:cNvPr id="17" name="TextBox 16">
-              <a:extLst>
-                <a:ext uri="{FF2B5EF4-FFF2-40B4-BE49-F238E27FC236}">
-                  <a16:creationId xmlns:a16="http://schemas.microsoft.com/office/drawing/2014/main" id="{B8F31451-8EB2-4FCD-96D2-3821F4449255}"/>
-                </a:ext>
-              </a:extLst>
-            </p:cNvPr>
-            <p:cNvSpPr txBox="1"/>
-            <p:nvPr/>
-          </p:nvSpPr>
-          <p:spPr>
-            <a:xfrm>
-              <a:off x="42637" y="2931886"/>
-              <a:ext cx="1010554" cy="1107996"/>
-            </a:xfrm>
-            <a:prstGeom prst="rect">
-              <a:avLst/>
-            </a:prstGeom>
-            <a:noFill/>
-          </p:spPr>
-          <p:txBody>
-            <a:bodyPr wrap="square" rtlCol="0">
-              <a:spAutoFit/>
-            </a:bodyPr>
-            <a:lstStyle/>
-            <a:p>
-              <a:r>
-                <a:rPr lang="en-CA" sz="6600" dirty="0"/>
-                <a:t>{</a:t>
-              </a:r>
-            </a:p>
-          </p:txBody>
-        </p:sp>
-        <p:sp>
-          <p:nvSpPr>
-            <p:cNvPr id="18" name="TextBox 17">
-              <a:extLst>
-                <a:ext uri="{FF2B5EF4-FFF2-40B4-BE49-F238E27FC236}">
-                  <a16:creationId xmlns:a16="http://schemas.microsoft.com/office/drawing/2014/main" id="{E539A03A-05A6-42AA-817C-335C09DF7DE8}"/>
-                </a:ext>
-              </a:extLst>
-            </p:cNvPr>
-            <p:cNvSpPr txBox="1"/>
-            <p:nvPr/>
-          </p:nvSpPr>
-          <p:spPr>
-            <a:xfrm>
-              <a:off x="-78463" y="3321317"/>
-              <a:ext cx="268512" cy="369332"/>
-            </a:xfrm>
-            <a:prstGeom prst="rect">
-              <a:avLst/>
-            </a:prstGeom>
-            <a:noFill/>
-          </p:spPr>
-          <p:txBody>
-            <a:bodyPr wrap="square" rtlCol="0">
-              <a:spAutoFit/>
-            </a:bodyPr>
-            <a:lstStyle/>
-            <a:p>
-              <a:r>
-                <a:rPr lang="en-CA" b="1" dirty="0"/>
-                <a:t>j</a:t>
-              </a:r>
-            </a:p>
-          </p:txBody>
-        </p:sp>
-        <p:sp>
-          <p:nvSpPr>
-            <p:cNvPr id="19" name="TextBox 18">
-              <a:extLst>
-                <a:ext uri="{FF2B5EF4-FFF2-40B4-BE49-F238E27FC236}">
-                  <a16:creationId xmlns:a16="http://schemas.microsoft.com/office/drawing/2014/main" id="{5094A94A-3B33-4806-A01C-D5CBCA5B6930}"/>
-                </a:ext>
-              </a:extLst>
-            </p:cNvPr>
-            <p:cNvSpPr txBox="1"/>
-            <p:nvPr/>
-          </p:nvSpPr>
-          <p:spPr>
-            <a:xfrm rot="16200000">
-              <a:off x="429721" y="3457262"/>
-              <a:ext cx="1010554" cy="1107996"/>
-            </a:xfrm>
-            <a:prstGeom prst="rect">
-              <a:avLst/>
-            </a:prstGeom>
-            <a:noFill/>
-          </p:spPr>
-          <p:txBody>
-            <a:bodyPr wrap="square" rtlCol="0">
-              <a:spAutoFit/>
-            </a:bodyPr>
-            <a:lstStyle/>
-            <a:p>
-              <a:r>
-                <a:rPr lang="en-CA" sz="6600" dirty="0"/>
-                <a:t>{</a:t>
-              </a:r>
-            </a:p>
-          </p:txBody>
-        </p:sp>
-        <p:sp>
-          <p:nvSpPr>
-            <p:cNvPr id="20" name="TextBox 19">
-              <a:extLst>
-                <a:ext uri="{FF2B5EF4-FFF2-40B4-BE49-F238E27FC236}">
-                  <a16:creationId xmlns:a16="http://schemas.microsoft.com/office/drawing/2014/main" id="{602ADB30-1F5C-46F7-AD38-28990AAC9392}"/>
-                </a:ext>
-              </a:extLst>
-            </p:cNvPr>
-            <p:cNvSpPr txBox="1"/>
-            <p:nvPr/>
-          </p:nvSpPr>
-          <p:spPr>
-            <a:xfrm>
-              <a:off x="861786" y="4331871"/>
-              <a:ext cx="268512" cy="369332"/>
-            </a:xfrm>
-            <a:prstGeom prst="rect">
-              <a:avLst/>
-            </a:prstGeom>
-            <a:noFill/>
-          </p:spPr>
-          <p:txBody>
-            <a:bodyPr wrap="square" rtlCol="0">
-              <a:spAutoFit/>
-            </a:bodyPr>
-            <a:lstStyle/>
-            <a:p>
-              <a:r>
-                <a:rPr lang="en-CA" b="1" dirty="0"/>
-                <a:t>i</a:t>
-              </a:r>
-            </a:p>
-          </p:txBody>
-        </p:sp>
-        <p:sp>
-          <p:nvSpPr>
-            <p:cNvPr id="21" name="Oval 20">
-              <a:extLst>
-                <a:ext uri="{FF2B5EF4-FFF2-40B4-BE49-F238E27FC236}">
-                  <a16:creationId xmlns:a16="http://schemas.microsoft.com/office/drawing/2014/main" id="{09D3436B-B83F-4DAB-BD11-FBC69224939A}"/>
-                </a:ext>
-              </a:extLst>
-            </p:cNvPr>
-            <p:cNvSpPr/>
-            <p:nvPr/>
-          </p:nvSpPr>
-          <p:spPr>
-            <a:xfrm>
-              <a:off x="2188454" y="3036183"/>
-              <a:ext cx="54000" cy="54000"/>
-            </a:xfrm>
-            <a:prstGeom prst="ellipse">
-              <a:avLst/>
-            </a:prstGeom>
-            <a:solidFill>
-              <a:schemeClr val="tx1"/>
-            </a:solidFill>
-            <a:ln>
-              <a:solidFill>
-                <a:schemeClr val="tx1"/>
-              </a:solidFill>
-            </a:ln>
-          </p:spPr>
-          <p:style>
-            <a:lnRef idx="2">
-              <a:schemeClr val="accent1">
-                <a:shade val="50000"/>
-              </a:schemeClr>
-            </a:lnRef>
-            <a:fillRef idx="1">
-              <a:schemeClr val="accent1"/>
-            </a:fillRef>
-            <a:effectRef idx="0">
-              <a:schemeClr val="accent1"/>
-            </a:effectRef>
-            <a:fontRef idx="minor">
-              <a:schemeClr val="lt1"/>
-            </a:fontRef>
-          </p:style>
-          <p:txBody>
-            <a:bodyPr rtlCol="0" anchor="ctr"/>
-            <a:lstStyle/>
-            <a:p>
-              <a:pPr algn="ctr"/>
-              <a:endParaRPr lang="en-CA"/>
-            </a:p>
-          </p:txBody>
-        </p:sp>
-        <p:sp>
-          <p:nvSpPr>
-            <p:cNvPr id="22" name="TextBox 21">
-              <a:extLst>
-                <a:ext uri="{FF2B5EF4-FFF2-40B4-BE49-F238E27FC236}">
-                  <a16:creationId xmlns:a16="http://schemas.microsoft.com/office/drawing/2014/main" id="{BDDF37E3-7780-41DB-8B95-BDD72DC4C488}"/>
-                </a:ext>
-              </a:extLst>
-            </p:cNvPr>
-            <p:cNvSpPr txBox="1"/>
-            <p:nvPr/>
-          </p:nvSpPr>
-          <p:spPr>
-            <a:xfrm>
-              <a:off x="2188453" y="2720851"/>
-              <a:ext cx="1511401" cy="369332"/>
-            </a:xfrm>
-            <a:prstGeom prst="rect">
-              <a:avLst/>
-            </a:prstGeom>
-            <a:noFill/>
-          </p:spPr>
-          <p:txBody>
-            <a:bodyPr wrap="square" rtlCol="0">
-              <a:spAutoFit/>
-            </a:bodyPr>
-            <a:lstStyle/>
-            <a:p>
-              <a:r>
-                <a:rPr lang="en-CA" dirty="0"/>
-                <a:t>P= (2, 1)</a:t>
-              </a:r>
-            </a:p>
-          </p:txBody>
-        </p:sp>
-        <p:cxnSp>
-          <p:nvCxnSpPr>
-            <p:cNvPr id="24" name="Straight Connector 23">
-              <a:extLst>
-                <a:ext uri="{FF2B5EF4-FFF2-40B4-BE49-F238E27FC236}">
-                  <a16:creationId xmlns:a16="http://schemas.microsoft.com/office/drawing/2014/main" id="{9E408C06-D7E0-443B-95E5-78D80FEC20D2}"/>
-                </a:ext>
-              </a:extLst>
-            </p:cNvPr>
-            <p:cNvCxnSpPr>
-              <a:cxnSpLocks/>
-            </p:cNvCxnSpPr>
-            <p:nvPr/>
-          </p:nvCxnSpPr>
-          <p:spPr>
-            <a:xfrm flipH="1">
-              <a:off x="598079" y="3090183"/>
-              <a:ext cx="1590374" cy="800860"/>
-            </a:xfrm>
-            <a:prstGeom prst="line">
-              <a:avLst/>
-            </a:prstGeom>
-            <a:ln w="76200">
-              <a:solidFill>
-                <a:schemeClr val="tx1"/>
-              </a:solidFill>
-              <a:headEnd type="triangle" w="med" len="med"/>
-              <a:tailEnd type="none" w="med" len="med"/>
-            </a:ln>
-          </p:spPr>
-          <p:style>
-            <a:lnRef idx="1">
-              <a:schemeClr val="accent1"/>
-            </a:lnRef>
-            <a:fillRef idx="0">
-              <a:schemeClr val="accent1"/>
-            </a:fillRef>
-            <a:effectRef idx="0">
-              <a:schemeClr val="accent1"/>
-            </a:effectRef>
-            <a:fontRef idx="minor">
-              <a:schemeClr val="tx1"/>
-            </a:fontRef>
-          </p:style>
-        </p:cxnSp>
-      </p:grpSp>
-      <p:sp>
-        <p:nvSpPr>
-          <p:cNvPr id="28" name="TextBox 27">
-            <a:extLst>
-              <a:ext uri="{FF2B5EF4-FFF2-40B4-BE49-F238E27FC236}">
-                <a16:creationId xmlns:a16="http://schemas.microsoft.com/office/drawing/2014/main" id="{659B7BA0-AB35-485E-8B2F-3CFC9F264D7D}"/>
-              </a:ext>
-            </a:extLst>
-          </p:cNvPr>
-          <p:cNvSpPr txBox="1"/>
-          <p:nvPr/>
-        </p:nvSpPr>
-        <p:spPr>
-          <a:xfrm>
-            <a:off x="1168585" y="3085853"/>
-            <a:ext cx="268512" cy="369332"/>
-          </a:xfrm>
-          <a:prstGeom prst="rect">
-            <a:avLst/>
-          </a:prstGeom>
-          <a:noFill/>
-        </p:spPr>
-        <p:txBody>
-          <a:bodyPr wrap="square" rtlCol="0">
-            <a:spAutoFit/>
-          </a:bodyPr>
-          <a:lstStyle/>
-          <a:p>
-            <a:r>
-              <a:rPr lang="en-CA" b="1" dirty="0"/>
-              <a:t>r</a:t>
-            </a:r>
-          </a:p>
-        </p:txBody>
-      </p:sp>
-    </p:spTree>
-    <p:extLst>
-      <p:ext uri="{BB962C8B-B14F-4D97-AF65-F5344CB8AC3E}">
-        <p14:creationId xmlns:p14="http://schemas.microsoft.com/office/powerpoint/2010/main" val="2232505287"/>
-      </p:ext>
-    </p:extLst>
-  </p:cSld>
-  <p:clrMapOvr>
-    <a:masterClrMapping/>
-  </p:clrMapOvr>
-</p:sld>
-</file>
-
-<file path=ppt/slides/slide5.xml><?xml version="1.0" encoding="utf-8"?>
 <p:sld xmlns:a="http://schemas.openxmlformats.org/drawingml/2006/main" xmlns:r="http://schemas.openxmlformats.org/officeDocument/2006/relationships" xmlns:p="http://schemas.openxmlformats.org/presentationml/2006/main">
   <p:cSld>
     <p:spTree>
@@ -8361,11 +7797,11 @@
           <p:nvPr/>
         </p:nvPicPr>
         <p:blipFill rotWithShape="1">
-          <a:blip r:embed="rId2">
+          <a:blip r:embed="rId3">
             <a:extLst>
               <a:ext uri="{BEBA8EAE-BF5A-486C-A8C5-ECC9F3942E4B}">
                 <a14:imgProps xmlns:a14="http://schemas.microsoft.com/office/drawing/2010/main">
-                  <a14:imgLayer r:embed="rId3">
+                  <a14:imgLayer r:embed="rId4">
                     <a14:imgEffect>
                       <a14:backgroundRemoval t="5229" b="47222" l="6710" r="44730">
                         <a14:foregroundMark x1="31189" y1="33905" x2="28493" y2="32680"/>
@@ -10941,10 +10377,1972 @@
           </p:txBody>
         </p:sp>
       </p:grpSp>
+      <p:sp>
+        <p:nvSpPr>
+          <p:cNvPr id="59" name="TextBox 58">
+            <a:extLst>
+              <a:ext uri="{FF2B5EF4-FFF2-40B4-BE49-F238E27FC236}">
+                <a16:creationId xmlns:a16="http://schemas.microsoft.com/office/drawing/2014/main" id="{2E764C84-B1B9-47FC-B1D2-6F7D677FFFC5}"/>
+              </a:ext>
+            </a:extLst>
+          </p:cNvPr>
+          <p:cNvSpPr txBox="1"/>
+          <p:nvPr/>
+        </p:nvSpPr>
+        <p:spPr>
+          <a:xfrm>
+            <a:off x="474867" y="280332"/>
+            <a:ext cx="560114" cy="400110"/>
+          </a:xfrm>
+          <a:prstGeom prst="rect">
+            <a:avLst/>
+          </a:prstGeom>
+          <a:noFill/>
+        </p:spPr>
+        <p:txBody>
+          <a:bodyPr wrap="square" rtlCol="0">
+            <a:spAutoFit/>
+          </a:bodyPr>
+          <a:lstStyle/>
+          <a:p>
+            <a:r>
+              <a:rPr lang="en-CA" sz="2000" b="1" dirty="0"/>
+              <a:t>1.</a:t>
+            </a:r>
+          </a:p>
+        </p:txBody>
+      </p:sp>
+      <p:sp>
+        <p:nvSpPr>
+          <p:cNvPr id="60" name="TextBox 59">
+            <a:extLst>
+              <a:ext uri="{FF2B5EF4-FFF2-40B4-BE49-F238E27FC236}">
+                <a16:creationId xmlns:a16="http://schemas.microsoft.com/office/drawing/2014/main" id="{89076B7A-AE15-4223-A52F-430069E03578}"/>
+              </a:ext>
+            </a:extLst>
+          </p:cNvPr>
+          <p:cNvSpPr txBox="1"/>
+          <p:nvPr/>
+        </p:nvSpPr>
+        <p:spPr>
+          <a:xfrm>
+            <a:off x="8743157" y="280332"/>
+            <a:ext cx="560114" cy="400110"/>
+          </a:xfrm>
+          <a:prstGeom prst="rect">
+            <a:avLst/>
+          </a:prstGeom>
+          <a:noFill/>
+        </p:spPr>
+        <p:txBody>
+          <a:bodyPr wrap="square" rtlCol="0">
+            <a:spAutoFit/>
+          </a:bodyPr>
+          <a:lstStyle/>
+          <a:p>
+            <a:r>
+              <a:rPr lang="en-CA" sz="2000" b="1" dirty="0"/>
+              <a:t>2.</a:t>
+            </a:r>
+          </a:p>
+        </p:txBody>
+      </p:sp>
+      <p:sp>
+        <p:nvSpPr>
+          <p:cNvPr id="61" name="TextBox 60">
+            <a:extLst>
+              <a:ext uri="{FF2B5EF4-FFF2-40B4-BE49-F238E27FC236}">
+                <a16:creationId xmlns:a16="http://schemas.microsoft.com/office/drawing/2014/main" id="{D287C937-03F7-48C2-B81F-675166216B40}"/>
+              </a:ext>
+            </a:extLst>
+          </p:cNvPr>
+          <p:cNvSpPr txBox="1"/>
+          <p:nvPr/>
+        </p:nvSpPr>
+        <p:spPr>
+          <a:xfrm>
+            <a:off x="474867" y="3666514"/>
+            <a:ext cx="560114" cy="400110"/>
+          </a:xfrm>
+          <a:prstGeom prst="rect">
+            <a:avLst/>
+          </a:prstGeom>
+          <a:noFill/>
+        </p:spPr>
+        <p:txBody>
+          <a:bodyPr wrap="square" rtlCol="0">
+            <a:spAutoFit/>
+          </a:bodyPr>
+          <a:lstStyle/>
+          <a:p>
+            <a:r>
+              <a:rPr lang="en-CA" sz="2000" b="1" dirty="0"/>
+              <a:t>3.</a:t>
+            </a:r>
+          </a:p>
+        </p:txBody>
+      </p:sp>
     </p:spTree>
     <p:extLst>
       <p:ext uri="{BB962C8B-B14F-4D97-AF65-F5344CB8AC3E}">
         <p14:creationId xmlns:p14="http://schemas.microsoft.com/office/powerpoint/2010/main" val="27870448"/>
+      </p:ext>
+    </p:extLst>
+  </p:cSld>
+  <p:clrMapOvr>
+    <a:masterClrMapping/>
+  </p:clrMapOvr>
+</p:sld>
+</file>
+
+<file path=ppt/slides/slide5.xml><?xml version="1.0" encoding="utf-8"?>
+<p:sld xmlns:a="http://schemas.openxmlformats.org/drawingml/2006/main" xmlns:r="http://schemas.openxmlformats.org/officeDocument/2006/relationships" xmlns:p="http://schemas.openxmlformats.org/presentationml/2006/main">
+  <p:cSld>
+    <p:spTree>
+      <p:nvGrpSpPr>
+        <p:cNvPr id="1" name=""/>
+        <p:cNvGrpSpPr/>
+        <p:nvPr/>
+      </p:nvGrpSpPr>
+      <p:grpSpPr>
+        <a:xfrm>
+          <a:off x="0" y="0"/>
+          <a:ext cx="0" cy="0"/>
+          <a:chOff x="0" y="0"/>
+          <a:chExt cx="0" cy="0"/>
+        </a:xfrm>
+      </p:grpSpPr>
+      <p:grpSp>
+        <p:nvGrpSpPr>
+          <p:cNvPr id="27" name="Group 26">
+            <a:extLst>
+              <a:ext uri="{FF2B5EF4-FFF2-40B4-BE49-F238E27FC236}">
+                <a16:creationId xmlns:a16="http://schemas.microsoft.com/office/drawing/2014/main" id="{4655A522-2B02-4D6C-B968-35BB7F51125C}"/>
+              </a:ext>
+            </a:extLst>
+          </p:cNvPr>
+          <p:cNvGrpSpPr/>
+          <p:nvPr/>
+        </p:nvGrpSpPr>
+        <p:grpSpPr>
+          <a:xfrm>
+            <a:off x="132552" y="398584"/>
+            <a:ext cx="4124319" cy="4483489"/>
+            <a:chOff x="-78463" y="217714"/>
+            <a:chExt cx="4124319" cy="4483489"/>
+          </a:xfrm>
+        </p:grpSpPr>
+        <p:cxnSp>
+          <p:nvCxnSpPr>
+            <p:cNvPr id="5" name="Straight Connector 4">
+              <a:extLst>
+                <a:ext uri="{FF2B5EF4-FFF2-40B4-BE49-F238E27FC236}">
+                  <a16:creationId xmlns:a16="http://schemas.microsoft.com/office/drawing/2014/main" id="{670BA2F8-FB15-47C1-8E3E-4CCFC5152ACE}"/>
+                </a:ext>
+              </a:extLst>
+            </p:cNvPr>
+            <p:cNvCxnSpPr>
+              <a:cxnSpLocks/>
+            </p:cNvCxnSpPr>
+            <p:nvPr/>
+          </p:nvCxnSpPr>
+          <p:spPr>
+            <a:xfrm>
+              <a:off x="580572" y="580571"/>
+              <a:ext cx="0" cy="3505200"/>
+            </a:xfrm>
+            <a:prstGeom prst="line">
+              <a:avLst/>
+            </a:prstGeom>
+            <a:ln w="28575">
+              <a:solidFill>
+                <a:schemeClr val="tx1"/>
+              </a:solidFill>
+            </a:ln>
+          </p:spPr>
+          <p:style>
+            <a:lnRef idx="1">
+              <a:schemeClr val="accent1"/>
+            </a:lnRef>
+            <a:fillRef idx="0">
+              <a:schemeClr val="accent1"/>
+            </a:fillRef>
+            <a:effectRef idx="0">
+              <a:schemeClr val="accent1"/>
+            </a:effectRef>
+            <a:fontRef idx="minor">
+              <a:schemeClr val="tx1"/>
+            </a:fontRef>
+          </p:style>
+        </p:cxnSp>
+        <p:cxnSp>
+          <p:nvCxnSpPr>
+            <p:cNvPr id="7" name="Straight Connector 6">
+              <a:extLst>
+                <a:ext uri="{FF2B5EF4-FFF2-40B4-BE49-F238E27FC236}">
+                  <a16:creationId xmlns:a16="http://schemas.microsoft.com/office/drawing/2014/main" id="{59D83D63-A0EE-419C-AF88-6FF32E972F62}"/>
+                </a:ext>
+              </a:extLst>
+            </p:cNvPr>
+            <p:cNvCxnSpPr>
+              <a:cxnSpLocks/>
+            </p:cNvCxnSpPr>
+            <p:nvPr/>
+          </p:nvCxnSpPr>
+          <p:spPr>
+            <a:xfrm flipH="1">
+              <a:off x="413658" y="3926114"/>
+              <a:ext cx="3331028" cy="0"/>
+            </a:xfrm>
+            <a:prstGeom prst="line">
+              <a:avLst/>
+            </a:prstGeom>
+            <a:ln w="28575">
+              <a:solidFill>
+                <a:schemeClr val="tx1"/>
+              </a:solidFill>
+            </a:ln>
+          </p:spPr>
+          <p:style>
+            <a:lnRef idx="1">
+              <a:schemeClr val="accent1"/>
+            </a:lnRef>
+            <a:fillRef idx="0">
+              <a:schemeClr val="accent1"/>
+            </a:fillRef>
+            <a:effectRef idx="0">
+              <a:schemeClr val="accent1"/>
+            </a:effectRef>
+            <a:fontRef idx="minor">
+              <a:schemeClr val="tx1"/>
+            </a:fontRef>
+          </p:style>
+        </p:cxnSp>
+        <p:sp>
+          <p:nvSpPr>
+            <p:cNvPr id="10" name="TextBox 9">
+              <a:extLst>
+                <a:ext uri="{FF2B5EF4-FFF2-40B4-BE49-F238E27FC236}">
+                  <a16:creationId xmlns:a16="http://schemas.microsoft.com/office/drawing/2014/main" id="{0FD3D336-9BEA-4AAF-B579-D656585AABC0}"/>
+                </a:ext>
+              </a:extLst>
+            </p:cNvPr>
+            <p:cNvSpPr txBox="1"/>
+            <p:nvPr/>
+          </p:nvSpPr>
+          <p:spPr>
+            <a:xfrm>
+              <a:off x="413658" y="217714"/>
+              <a:ext cx="268512" cy="369332"/>
+            </a:xfrm>
+            <a:prstGeom prst="rect">
+              <a:avLst/>
+            </a:prstGeom>
+            <a:noFill/>
+          </p:spPr>
+          <p:txBody>
+            <a:bodyPr wrap="square" rtlCol="0">
+              <a:spAutoFit/>
+            </a:bodyPr>
+            <a:lstStyle/>
+            <a:p>
+              <a:r>
+                <a:rPr lang="en-CA" i="1" dirty="0"/>
+                <a:t>y</a:t>
+              </a:r>
+            </a:p>
+          </p:txBody>
+        </p:sp>
+        <p:sp>
+          <p:nvSpPr>
+            <p:cNvPr id="11" name="TextBox 10">
+              <a:extLst>
+                <a:ext uri="{FF2B5EF4-FFF2-40B4-BE49-F238E27FC236}">
+                  <a16:creationId xmlns:a16="http://schemas.microsoft.com/office/drawing/2014/main" id="{08376D9B-6F84-4C20-BDBA-E8F703C66DB0}"/>
+                </a:ext>
+              </a:extLst>
+            </p:cNvPr>
+            <p:cNvSpPr txBox="1"/>
+            <p:nvPr/>
+          </p:nvSpPr>
+          <p:spPr>
+            <a:xfrm>
+              <a:off x="3777344" y="3715655"/>
+              <a:ext cx="268512" cy="369332"/>
+            </a:xfrm>
+            <a:prstGeom prst="rect">
+              <a:avLst/>
+            </a:prstGeom>
+            <a:noFill/>
+          </p:spPr>
+          <p:txBody>
+            <a:bodyPr wrap="square" rtlCol="0">
+              <a:spAutoFit/>
+            </a:bodyPr>
+            <a:lstStyle/>
+            <a:p>
+              <a:r>
+                <a:rPr lang="en-CA" i="1" dirty="0"/>
+                <a:t>x</a:t>
+              </a:r>
+            </a:p>
+          </p:txBody>
+        </p:sp>
+        <p:cxnSp>
+          <p:nvCxnSpPr>
+            <p:cNvPr id="12" name="Straight Connector 11">
+              <a:extLst>
+                <a:ext uri="{FF2B5EF4-FFF2-40B4-BE49-F238E27FC236}">
+                  <a16:creationId xmlns:a16="http://schemas.microsoft.com/office/drawing/2014/main" id="{D83DE000-DAEF-4535-8A84-F8E8A5EBD6F4}"/>
+                </a:ext>
+              </a:extLst>
+            </p:cNvPr>
+            <p:cNvCxnSpPr>
+              <a:cxnSpLocks/>
+            </p:cNvCxnSpPr>
+            <p:nvPr/>
+          </p:nvCxnSpPr>
+          <p:spPr>
+            <a:xfrm flipH="1">
+              <a:off x="580572" y="3926114"/>
+              <a:ext cx="830941" cy="0"/>
+            </a:xfrm>
+            <a:prstGeom prst="line">
+              <a:avLst/>
+            </a:prstGeom>
+            <a:ln w="76200">
+              <a:solidFill>
+                <a:schemeClr val="tx1"/>
+              </a:solidFill>
+              <a:headEnd type="triangle" w="med" len="med"/>
+              <a:tailEnd type="none" w="med" len="med"/>
+            </a:ln>
+          </p:spPr>
+          <p:style>
+            <a:lnRef idx="1">
+              <a:schemeClr val="accent1"/>
+            </a:lnRef>
+            <a:fillRef idx="0">
+              <a:schemeClr val="accent1"/>
+            </a:fillRef>
+            <a:effectRef idx="0">
+              <a:schemeClr val="accent1"/>
+            </a:effectRef>
+            <a:fontRef idx="minor">
+              <a:schemeClr val="tx1"/>
+            </a:fontRef>
+          </p:style>
+        </p:cxnSp>
+        <p:cxnSp>
+          <p:nvCxnSpPr>
+            <p:cNvPr id="14" name="Straight Connector 13">
+              <a:extLst>
+                <a:ext uri="{FF2B5EF4-FFF2-40B4-BE49-F238E27FC236}">
+                  <a16:creationId xmlns:a16="http://schemas.microsoft.com/office/drawing/2014/main" id="{1A4D0860-2F96-4080-BF36-8C77EC73A973}"/>
+                </a:ext>
+              </a:extLst>
+            </p:cNvPr>
+            <p:cNvCxnSpPr>
+              <a:cxnSpLocks/>
+            </p:cNvCxnSpPr>
+            <p:nvPr/>
+          </p:nvCxnSpPr>
+          <p:spPr>
+            <a:xfrm>
+              <a:off x="580570" y="3090183"/>
+              <a:ext cx="1" cy="831600"/>
+            </a:xfrm>
+            <a:prstGeom prst="line">
+              <a:avLst/>
+            </a:prstGeom>
+            <a:ln w="76200">
+              <a:solidFill>
+                <a:schemeClr val="tx1"/>
+              </a:solidFill>
+              <a:headEnd type="triangle" w="med" len="med"/>
+              <a:tailEnd type="none" w="med" len="med"/>
+            </a:ln>
+          </p:spPr>
+          <p:style>
+            <a:lnRef idx="1">
+              <a:schemeClr val="accent1"/>
+            </a:lnRef>
+            <a:fillRef idx="0">
+              <a:schemeClr val="accent1"/>
+            </a:fillRef>
+            <a:effectRef idx="0">
+              <a:schemeClr val="accent1"/>
+            </a:effectRef>
+            <a:fontRef idx="minor">
+              <a:schemeClr val="tx1"/>
+            </a:fontRef>
+          </p:style>
+        </p:cxnSp>
+        <p:cxnSp>
+          <p:nvCxnSpPr>
+            <p:cNvPr id="16" name="Straight Connector 15">
+              <a:extLst>
+                <a:ext uri="{FF2B5EF4-FFF2-40B4-BE49-F238E27FC236}">
+                  <a16:creationId xmlns:a16="http://schemas.microsoft.com/office/drawing/2014/main" id="{0403D28C-1F68-49A6-9CC4-8C3EB00B70A3}"/>
+                </a:ext>
+              </a:extLst>
+            </p:cNvPr>
+            <p:cNvCxnSpPr>
+              <a:cxnSpLocks/>
+            </p:cNvCxnSpPr>
+            <p:nvPr/>
+          </p:nvCxnSpPr>
+          <p:spPr>
+            <a:xfrm flipH="1">
+              <a:off x="1411513" y="3921783"/>
+              <a:ext cx="830941" cy="0"/>
+            </a:xfrm>
+            <a:prstGeom prst="line">
+              <a:avLst/>
+            </a:prstGeom>
+            <a:ln w="76200">
+              <a:solidFill>
+                <a:schemeClr val="tx1"/>
+              </a:solidFill>
+              <a:headEnd type="triangle" w="med" len="med"/>
+              <a:tailEnd type="none" w="med" len="med"/>
+            </a:ln>
+          </p:spPr>
+          <p:style>
+            <a:lnRef idx="1">
+              <a:schemeClr val="accent1"/>
+            </a:lnRef>
+            <a:fillRef idx="0">
+              <a:schemeClr val="accent1"/>
+            </a:fillRef>
+            <a:effectRef idx="0">
+              <a:schemeClr val="accent1"/>
+            </a:effectRef>
+            <a:fontRef idx="minor">
+              <a:schemeClr val="tx1"/>
+            </a:fontRef>
+          </p:style>
+        </p:cxnSp>
+        <p:sp>
+          <p:nvSpPr>
+            <p:cNvPr id="17" name="TextBox 16">
+              <a:extLst>
+                <a:ext uri="{FF2B5EF4-FFF2-40B4-BE49-F238E27FC236}">
+                  <a16:creationId xmlns:a16="http://schemas.microsoft.com/office/drawing/2014/main" id="{B8F31451-8EB2-4FCD-96D2-3821F4449255}"/>
+                </a:ext>
+              </a:extLst>
+            </p:cNvPr>
+            <p:cNvSpPr txBox="1"/>
+            <p:nvPr/>
+          </p:nvSpPr>
+          <p:spPr>
+            <a:xfrm>
+              <a:off x="42637" y="2931886"/>
+              <a:ext cx="1010554" cy="1107996"/>
+            </a:xfrm>
+            <a:prstGeom prst="rect">
+              <a:avLst/>
+            </a:prstGeom>
+            <a:noFill/>
+          </p:spPr>
+          <p:txBody>
+            <a:bodyPr wrap="square" rtlCol="0">
+              <a:spAutoFit/>
+            </a:bodyPr>
+            <a:lstStyle/>
+            <a:p>
+              <a:r>
+                <a:rPr lang="en-CA" sz="6600" dirty="0"/>
+                <a:t>{</a:t>
+              </a:r>
+            </a:p>
+          </p:txBody>
+        </p:sp>
+        <p:sp>
+          <p:nvSpPr>
+            <p:cNvPr id="18" name="TextBox 17">
+              <a:extLst>
+                <a:ext uri="{FF2B5EF4-FFF2-40B4-BE49-F238E27FC236}">
+                  <a16:creationId xmlns:a16="http://schemas.microsoft.com/office/drawing/2014/main" id="{E539A03A-05A6-42AA-817C-335C09DF7DE8}"/>
+                </a:ext>
+              </a:extLst>
+            </p:cNvPr>
+            <p:cNvSpPr txBox="1"/>
+            <p:nvPr/>
+          </p:nvSpPr>
+          <p:spPr>
+            <a:xfrm>
+              <a:off x="-78463" y="3321317"/>
+              <a:ext cx="268512" cy="369332"/>
+            </a:xfrm>
+            <a:prstGeom prst="rect">
+              <a:avLst/>
+            </a:prstGeom>
+            <a:noFill/>
+          </p:spPr>
+          <p:txBody>
+            <a:bodyPr wrap="square" rtlCol="0">
+              <a:spAutoFit/>
+            </a:bodyPr>
+            <a:lstStyle/>
+            <a:p>
+              <a:r>
+                <a:rPr lang="en-CA" b="1" dirty="0"/>
+                <a:t>j</a:t>
+              </a:r>
+            </a:p>
+          </p:txBody>
+        </p:sp>
+        <p:sp>
+          <p:nvSpPr>
+            <p:cNvPr id="19" name="TextBox 18">
+              <a:extLst>
+                <a:ext uri="{FF2B5EF4-FFF2-40B4-BE49-F238E27FC236}">
+                  <a16:creationId xmlns:a16="http://schemas.microsoft.com/office/drawing/2014/main" id="{5094A94A-3B33-4806-A01C-D5CBCA5B6930}"/>
+                </a:ext>
+              </a:extLst>
+            </p:cNvPr>
+            <p:cNvSpPr txBox="1"/>
+            <p:nvPr/>
+          </p:nvSpPr>
+          <p:spPr>
+            <a:xfrm rot="16200000">
+              <a:off x="429721" y="3457262"/>
+              <a:ext cx="1010554" cy="1107996"/>
+            </a:xfrm>
+            <a:prstGeom prst="rect">
+              <a:avLst/>
+            </a:prstGeom>
+            <a:noFill/>
+          </p:spPr>
+          <p:txBody>
+            <a:bodyPr wrap="square" rtlCol="0">
+              <a:spAutoFit/>
+            </a:bodyPr>
+            <a:lstStyle/>
+            <a:p>
+              <a:r>
+                <a:rPr lang="en-CA" sz="6600" dirty="0"/>
+                <a:t>{</a:t>
+              </a:r>
+            </a:p>
+          </p:txBody>
+        </p:sp>
+        <p:sp>
+          <p:nvSpPr>
+            <p:cNvPr id="20" name="TextBox 19">
+              <a:extLst>
+                <a:ext uri="{FF2B5EF4-FFF2-40B4-BE49-F238E27FC236}">
+                  <a16:creationId xmlns:a16="http://schemas.microsoft.com/office/drawing/2014/main" id="{602ADB30-1F5C-46F7-AD38-28990AAC9392}"/>
+                </a:ext>
+              </a:extLst>
+            </p:cNvPr>
+            <p:cNvSpPr txBox="1"/>
+            <p:nvPr/>
+          </p:nvSpPr>
+          <p:spPr>
+            <a:xfrm>
+              <a:off x="861786" y="4331871"/>
+              <a:ext cx="268512" cy="369332"/>
+            </a:xfrm>
+            <a:prstGeom prst="rect">
+              <a:avLst/>
+            </a:prstGeom>
+            <a:noFill/>
+          </p:spPr>
+          <p:txBody>
+            <a:bodyPr wrap="square" rtlCol="0">
+              <a:spAutoFit/>
+            </a:bodyPr>
+            <a:lstStyle/>
+            <a:p>
+              <a:r>
+                <a:rPr lang="en-CA" b="1" dirty="0"/>
+                <a:t>i</a:t>
+              </a:r>
+            </a:p>
+          </p:txBody>
+        </p:sp>
+        <p:sp>
+          <p:nvSpPr>
+            <p:cNvPr id="21" name="Oval 20">
+              <a:extLst>
+                <a:ext uri="{FF2B5EF4-FFF2-40B4-BE49-F238E27FC236}">
+                  <a16:creationId xmlns:a16="http://schemas.microsoft.com/office/drawing/2014/main" id="{09D3436B-B83F-4DAB-BD11-FBC69224939A}"/>
+                </a:ext>
+              </a:extLst>
+            </p:cNvPr>
+            <p:cNvSpPr/>
+            <p:nvPr/>
+          </p:nvSpPr>
+          <p:spPr>
+            <a:xfrm>
+              <a:off x="2188454" y="3036183"/>
+              <a:ext cx="54000" cy="54000"/>
+            </a:xfrm>
+            <a:prstGeom prst="ellipse">
+              <a:avLst/>
+            </a:prstGeom>
+            <a:solidFill>
+              <a:schemeClr val="tx1"/>
+            </a:solidFill>
+            <a:ln>
+              <a:solidFill>
+                <a:schemeClr val="tx1"/>
+              </a:solidFill>
+            </a:ln>
+          </p:spPr>
+          <p:style>
+            <a:lnRef idx="2">
+              <a:schemeClr val="accent1">
+                <a:shade val="50000"/>
+              </a:schemeClr>
+            </a:lnRef>
+            <a:fillRef idx="1">
+              <a:schemeClr val="accent1"/>
+            </a:fillRef>
+            <a:effectRef idx="0">
+              <a:schemeClr val="accent1"/>
+            </a:effectRef>
+            <a:fontRef idx="minor">
+              <a:schemeClr val="lt1"/>
+            </a:fontRef>
+          </p:style>
+          <p:txBody>
+            <a:bodyPr rtlCol="0" anchor="ctr"/>
+            <a:lstStyle/>
+            <a:p>
+              <a:pPr algn="ctr"/>
+              <a:endParaRPr lang="en-CA"/>
+            </a:p>
+          </p:txBody>
+        </p:sp>
+        <p:sp>
+          <p:nvSpPr>
+            <p:cNvPr id="22" name="TextBox 21">
+              <a:extLst>
+                <a:ext uri="{FF2B5EF4-FFF2-40B4-BE49-F238E27FC236}">
+                  <a16:creationId xmlns:a16="http://schemas.microsoft.com/office/drawing/2014/main" id="{BDDF37E3-7780-41DB-8B95-BDD72DC4C488}"/>
+                </a:ext>
+              </a:extLst>
+            </p:cNvPr>
+            <p:cNvSpPr txBox="1"/>
+            <p:nvPr/>
+          </p:nvSpPr>
+          <p:spPr>
+            <a:xfrm>
+              <a:off x="2188453" y="2720851"/>
+              <a:ext cx="1511401" cy="369332"/>
+            </a:xfrm>
+            <a:prstGeom prst="rect">
+              <a:avLst/>
+            </a:prstGeom>
+            <a:noFill/>
+          </p:spPr>
+          <p:txBody>
+            <a:bodyPr wrap="square" rtlCol="0">
+              <a:spAutoFit/>
+            </a:bodyPr>
+            <a:lstStyle/>
+            <a:p>
+              <a:r>
+                <a:rPr lang="en-CA" dirty="0"/>
+                <a:t>P= (2, 1)</a:t>
+              </a:r>
+            </a:p>
+          </p:txBody>
+        </p:sp>
+        <p:cxnSp>
+          <p:nvCxnSpPr>
+            <p:cNvPr id="24" name="Straight Connector 23">
+              <a:extLst>
+                <a:ext uri="{FF2B5EF4-FFF2-40B4-BE49-F238E27FC236}">
+                  <a16:creationId xmlns:a16="http://schemas.microsoft.com/office/drawing/2014/main" id="{9E408C06-D7E0-443B-95E5-78D80FEC20D2}"/>
+                </a:ext>
+              </a:extLst>
+            </p:cNvPr>
+            <p:cNvCxnSpPr>
+              <a:cxnSpLocks/>
+            </p:cNvCxnSpPr>
+            <p:nvPr/>
+          </p:nvCxnSpPr>
+          <p:spPr>
+            <a:xfrm flipH="1">
+              <a:off x="598079" y="3090183"/>
+              <a:ext cx="1590374" cy="800860"/>
+            </a:xfrm>
+            <a:prstGeom prst="line">
+              <a:avLst/>
+            </a:prstGeom>
+            <a:ln w="76200">
+              <a:solidFill>
+                <a:schemeClr val="tx1"/>
+              </a:solidFill>
+              <a:headEnd type="triangle" w="med" len="med"/>
+              <a:tailEnd type="none" w="med" len="med"/>
+            </a:ln>
+          </p:spPr>
+          <p:style>
+            <a:lnRef idx="1">
+              <a:schemeClr val="accent1"/>
+            </a:lnRef>
+            <a:fillRef idx="0">
+              <a:schemeClr val="accent1"/>
+            </a:fillRef>
+            <a:effectRef idx="0">
+              <a:schemeClr val="accent1"/>
+            </a:effectRef>
+            <a:fontRef idx="minor">
+              <a:schemeClr val="tx1"/>
+            </a:fontRef>
+          </p:style>
+        </p:cxnSp>
+      </p:grpSp>
+      <p:sp>
+        <p:nvSpPr>
+          <p:cNvPr id="28" name="TextBox 27">
+            <a:extLst>
+              <a:ext uri="{FF2B5EF4-FFF2-40B4-BE49-F238E27FC236}">
+                <a16:creationId xmlns:a16="http://schemas.microsoft.com/office/drawing/2014/main" id="{659B7BA0-AB35-485E-8B2F-3CFC9F264D7D}"/>
+              </a:ext>
+            </a:extLst>
+          </p:cNvPr>
+          <p:cNvSpPr txBox="1"/>
+          <p:nvPr/>
+        </p:nvSpPr>
+        <p:spPr>
+          <a:xfrm>
+            <a:off x="1379600" y="3266723"/>
+            <a:ext cx="268512" cy="369332"/>
+          </a:xfrm>
+          <a:prstGeom prst="rect">
+            <a:avLst/>
+          </a:prstGeom>
+          <a:noFill/>
+        </p:spPr>
+        <p:txBody>
+          <a:bodyPr wrap="square" rtlCol="0">
+            <a:spAutoFit/>
+          </a:bodyPr>
+          <a:lstStyle/>
+          <a:p>
+            <a:r>
+              <a:rPr lang="en-CA" b="1" dirty="0"/>
+              <a:t>r</a:t>
+            </a:r>
+          </a:p>
+        </p:txBody>
+      </p:sp>
+      <p:sp>
+        <p:nvSpPr>
+          <p:cNvPr id="36" name="Freeform: Shape 35">
+            <a:extLst>
+              <a:ext uri="{FF2B5EF4-FFF2-40B4-BE49-F238E27FC236}">
+                <a16:creationId xmlns:a16="http://schemas.microsoft.com/office/drawing/2014/main" id="{9F7B1000-97CE-4098-A5CC-31A3C1C09F10}"/>
+              </a:ext>
+            </a:extLst>
+          </p:cNvPr>
+          <p:cNvSpPr/>
+          <p:nvPr/>
+        </p:nvSpPr>
+        <p:spPr>
+          <a:xfrm>
+            <a:off x="6081348" y="2504715"/>
+            <a:ext cx="3002226" cy="1172448"/>
+          </a:xfrm>
+          <a:custGeom>
+            <a:avLst/>
+            <a:gdLst>
+              <a:gd name="connsiteX0" fmla="*/ 0 w 1943100"/>
+              <a:gd name="connsiteY0" fmla="*/ 850926 h 927126"/>
+              <a:gd name="connsiteX1" fmla="*/ 304800 w 1943100"/>
+              <a:gd name="connsiteY1" fmla="*/ 450876 h 927126"/>
+              <a:gd name="connsiteX2" fmla="*/ 561975 w 1943100"/>
+              <a:gd name="connsiteY2" fmla="*/ 184176 h 927126"/>
+              <a:gd name="connsiteX3" fmla="*/ 981075 w 1943100"/>
+              <a:gd name="connsiteY3" fmla="*/ 12726 h 927126"/>
+              <a:gd name="connsiteX4" fmla="*/ 1390650 w 1943100"/>
+              <a:gd name="connsiteY4" fmla="*/ 31776 h 927126"/>
+              <a:gd name="connsiteX5" fmla="*/ 1724025 w 1943100"/>
+              <a:gd name="connsiteY5" fmla="*/ 184176 h 927126"/>
+              <a:gd name="connsiteX6" fmla="*/ 1885950 w 1943100"/>
+              <a:gd name="connsiteY6" fmla="*/ 527076 h 927126"/>
+              <a:gd name="connsiteX7" fmla="*/ 1943100 w 1943100"/>
+              <a:gd name="connsiteY7" fmla="*/ 927126 h 927126"/>
+            </a:gdLst>
+            <a:ahLst/>
+            <a:cxnLst>
+              <a:cxn ang="0">
+                <a:pos x="connsiteX0" y="connsiteY0"/>
+              </a:cxn>
+              <a:cxn ang="0">
+                <a:pos x="connsiteX1" y="connsiteY1"/>
+              </a:cxn>
+              <a:cxn ang="0">
+                <a:pos x="connsiteX2" y="connsiteY2"/>
+              </a:cxn>
+              <a:cxn ang="0">
+                <a:pos x="connsiteX3" y="connsiteY3"/>
+              </a:cxn>
+              <a:cxn ang="0">
+                <a:pos x="connsiteX4" y="connsiteY4"/>
+              </a:cxn>
+              <a:cxn ang="0">
+                <a:pos x="connsiteX5" y="connsiteY5"/>
+              </a:cxn>
+              <a:cxn ang="0">
+                <a:pos x="connsiteX6" y="connsiteY6"/>
+              </a:cxn>
+              <a:cxn ang="0">
+                <a:pos x="connsiteX7" y="connsiteY7"/>
+              </a:cxn>
+            </a:cxnLst>
+            <a:rect l="l" t="t" r="r" b="b"/>
+            <a:pathLst>
+              <a:path w="1943100" h="927126">
+                <a:moveTo>
+                  <a:pt x="0" y="850926"/>
+                </a:moveTo>
+                <a:cubicBezTo>
+                  <a:pt x="105569" y="706463"/>
+                  <a:pt x="211138" y="562001"/>
+                  <a:pt x="304800" y="450876"/>
+                </a:cubicBezTo>
+                <a:cubicBezTo>
+                  <a:pt x="398462" y="339751"/>
+                  <a:pt x="449263" y="257201"/>
+                  <a:pt x="561975" y="184176"/>
+                </a:cubicBezTo>
+                <a:cubicBezTo>
+                  <a:pt x="674687" y="111151"/>
+                  <a:pt x="842962" y="38126"/>
+                  <a:pt x="981075" y="12726"/>
+                </a:cubicBezTo>
+                <a:cubicBezTo>
+                  <a:pt x="1119188" y="-12674"/>
+                  <a:pt x="1266825" y="3201"/>
+                  <a:pt x="1390650" y="31776"/>
+                </a:cubicBezTo>
+                <a:cubicBezTo>
+                  <a:pt x="1514475" y="60351"/>
+                  <a:pt x="1641475" y="101626"/>
+                  <a:pt x="1724025" y="184176"/>
+                </a:cubicBezTo>
+                <a:cubicBezTo>
+                  <a:pt x="1806575" y="266726"/>
+                  <a:pt x="1849438" y="403251"/>
+                  <a:pt x="1885950" y="527076"/>
+                </a:cubicBezTo>
+                <a:cubicBezTo>
+                  <a:pt x="1922463" y="650901"/>
+                  <a:pt x="1932781" y="789013"/>
+                  <a:pt x="1943100" y="927126"/>
+                </a:cubicBezTo>
+              </a:path>
+            </a:pathLst>
+          </a:custGeom>
+          <a:noFill/>
+          <a:ln w="19050">
+            <a:solidFill>
+              <a:srgbClr val="FF0000"/>
+            </a:solidFill>
+          </a:ln>
+        </p:spPr>
+        <p:style>
+          <a:lnRef idx="2">
+            <a:schemeClr val="accent1">
+              <a:shade val="50000"/>
+            </a:schemeClr>
+          </a:lnRef>
+          <a:fillRef idx="1">
+            <a:schemeClr val="accent1"/>
+          </a:fillRef>
+          <a:effectRef idx="0">
+            <a:schemeClr val="accent1"/>
+          </a:effectRef>
+          <a:fontRef idx="minor">
+            <a:schemeClr val="lt1"/>
+          </a:fontRef>
+        </p:style>
+        <p:txBody>
+          <a:bodyPr rtlCol="0" anchor="ctr"/>
+          <a:lstStyle/>
+          <a:p>
+            <a:pPr algn="ctr"/>
+            <a:endParaRPr lang="en-CA"/>
+          </a:p>
+        </p:txBody>
+      </p:sp>
+      <p:grpSp>
+        <p:nvGrpSpPr>
+          <p:cNvPr id="37" name="Group 36">
+            <a:extLst>
+              <a:ext uri="{FF2B5EF4-FFF2-40B4-BE49-F238E27FC236}">
+                <a16:creationId xmlns:a16="http://schemas.microsoft.com/office/drawing/2014/main" id="{3D760F7E-63CE-40DF-9CE1-D654DD0455EE}"/>
+              </a:ext>
+            </a:extLst>
+          </p:cNvPr>
+          <p:cNvGrpSpPr/>
+          <p:nvPr/>
+        </p:nvGrpSpPr>
+        <p:grpSpPr>
+          <a:xfrm rot="17549567">
+            <a:off x="7109933" y="1828082"/>
+            <a:ext cx="1392340" cy="2516610"/>
+            <a:chOff x="3026229" y="1535793"/>
+            <a:chExt cx="1101008" cy="1628800"/>
+          </a:xfrm>
+        </p:grpSpPr>
+        <p:sp>
+          <p:nvSpPr>
+            <p:cNvPr id="38" name="Oval 37">
+              <a:extLst>
+                <a:ext uri="{FF2B5EF4-FFF2-40B4-BE49-F238E27FC236}">
+                  <a16:creationId xmlns:a16="http://schemas.microsoft.com/office/drawing/2014/main" id="{AD049E76-E896-4E44-BD4C-D506F0EF460B}"/>
+                </a:ext>
+              </a:extLst>
+            </p:cNvPr>
+            <p:cNvSpPr/>
+            <p:nvPr/>
+          </p:nvSpPr>
+          <p:spPr>
+            <a:xfrm>
+              <a:off x="3820358" y="3110593"/>
+              <a:ext cx="54000" cy="54000"/>
+            </a:xfrm>
+            <a:prstGeom prst="ellipse">
+              <a:avLst/>
+            </a:prstGeom>
+            <a:solidFill>
+              <a:schemeClr val="tx1"/>
+            </a:solidFill>
+            <a:ln>
+              <a:solidFill>
+                <a:schemeClr val="tx1"/>
+              </a:solidFill>
+            </a:ln>
+          </p:spPr>
+          <p:style>
+            <a:lnRef idx="2">
+              <a:schemeClr val="accent1">
+                <a:shade val="50000"/>
+              </a:schemeClr>
+            </a:lnRef>
+            <a:fillRef idx="1">
+              <a:schemeClr val="accent1"/>
+            </a:fillRef>
+            <a:effectRef idx="0">
+              <a:schemeClr val="accent1"/>
+            </a:effectRef>
+            <a:fontRef idx="minor">
+              <a:schemeClr val="lt1"/>
+            </a:fontRef>
+          </p:style>
+          <p:txBody>
+            <a:bodyPr rtlCol="0" anchor="ctr"/>
+            <a:lstStyle/>
+            <a:p>
+              <a:pPr algn="ctr"/>
+              <a:endParaRPr lang="en-CA"/>
+            </a:p>
+          </p:txBody>
+        </p:sp>
+        <p:sp>
+          <p:nvSpPr>
+            <p:cNvPr id="39" name="Oval 38">
+              <a:extLst>
+                <a:ext uri="{FF2B5EF4-FFF2-40B4-BE49-F238E27FC236}">
+                  <a16:creationId xmlns:a16="http://schemas.microsoft.com/office/drawing/2014/main" id="{169A41AC-F8DB-43F0-97F1-9023DD53A3B3}"/>
+                </a:ext>
+              </a:extLst>
+            </p:cNvPr>
+            <p:cNvSpPr/>
+            <p:nvPr/>
+          </p:nvSpPr>
+          <p:spPr>
+            <a:xfrm>
+              <a:off x="4064454" y="2831193"/>
+              <a:ext cx="54000" cy="54000"/>
+            </a:xfrm>
+            <a:prstGeom prst="ellipse">
+              <a:avLst/>
+            </a:prstGeom>
+            <a:solidFill>
+              <a:schemeClr val="tx1"/>
+            </a:solidFill>
+            <a:ln>
+              <a:solidFill>
+                <a:schemeClr val="tx1"/>
+              </a:solidFill>
+            </a:ln>
+          </p:spPr>
+          <p:style>
+            <a:lnRef idx="2">
+              <a:schemeClr val="accent1">
+                <a:shade val="50000"/>
+              </a:schemeClr>
+            </a:lnRef>
+            <a:fillRef idx="1">
+              <a:schemeClr val="accent1"/>
+            </a:fillRef>
+            <a:effectRef idx="0">
+              <a:schemeClr val="accent1"/>
+            </a:effectRef>
+            <a:fontRef idx="minor">
+              <a:schemeClr val="lt1"/>
+            </a:fontRef>
+          </p:style>
+          <p:txBody>
+            <a:bodyPr rtlCol="0" anchor="ctr"/>
+            <a:lstStyle/>
+            <a:p>
+              <a:pPr algn="ctr"/>
+              <a:endParaRPr lang="en-CA"/>
+            </a:p>
+          </p:txBody>
+        </p:sp>
+        <p:sp>
+          <p:nvSpPr>
+            <p:cNvPr id="40" name="Oval 39">
+              <a:extLst>
+                <a:ext uri="{FF2B5EF4-FFF2-40B4-BE49-F238E27FC236}">
+                  <a16:creationId xmlns:a16="http://schemas.microsoft.com/office/drawing/2014/main" id="{AA9BB133-294B-497E-9D3B-F7548F111E4E}"/>
+                </a:ext>
+              </a:extLst>
+            </p:cNvPr>
+            <p:cNvSpPr/>
+            <p:nvPr/>
+          </p:nvSpPr>
+          <p:spPr>
+            <a:xfrm>
+              <a:off x="4073237" y="2472418"/>
+              <a:ext cx="54000" cy="54000"/>
+            </a:xfrm>
+            <a:prstGeom prst="ellipse">
+              <a:avLst/>
+            </a:prstGeom>
+            <a:solidFill>
+              <a:schemeClr val="tx1"/>
+            </a:solidFill>
+            <a:ln>
+              <a:solidFill>
+                <a:schemeClr val="tx1"/>
+              </a:solidFill>
+            </a:ln>
+          </p:spPr>
+          <p:style>
+            <a:lnRef idx="2">
+              <a:schemeClr val="accent1">
+                <a:shade val="50000"/>
+              </a:schemeClr>
+            </a:lnRef>
+            <a:fillRef idx="1">
+              <a:schemeClr val="accent1"/>
+            </a:fillRef>
+            <a:effectRef idx="0">
+              <a:schemeClr val="accent1"/>
+            </a:effectRef>
+            <a:fontRef idx="minor">
+              <a:schemeClr val="lt1"/>
+            </a:fontRef>
+          </p:style>
+          <p:txBody>
+            <a:bodyPr rtlCol="0" anchor="ctr"/>
+            <a:lstStyle/>
+            <a:p>
+              <a:pPr algn="ctr"/>
+              <a:endParaRPr lang="en-CA"/>
+            </a:p>
+          </p:txBody>
+        </p:sp>
+        <p:sp>
+          <p:nvSpPr>
+            <p:cNvPr id="41" name="Oval 40">
+              <a:extLst>
+                <a:ext uri="{FF2B5EF4-FFF2-40B4-BE49-F238E27FC236}">
+                  <a16:creationId xmlns:a16="http://schemas.microsoft.com/office/drawing/2014/main" id="{2F2CA3F2-1121-46E5-8B6B-6F98C6E73464}"/>
+                </a:ext>
+              </a:extLst>
+            </p:cNvPr>
+            <p:cNvSpPr/>
+            <p:nvPr/>
+          </p:nvSpPr>
+          <p:spPr>
+            <a:xfrm>
+              <a:off x="3944662" y="2075823"/>
+              <a:ext cx="54000" cy="54000"/>
+            </a:xfrm>
+            <a:prstGeom prst="ellipse">
+              <a:avLst/>
+            </a:prstGeom>
+            <a:solidFill>
+              <a:schemeClr val="tx1"/>
+            </a:solidFill>
+            <a:ln>
+              <a:solidFill>
+                <a:schemeClr val="tx1"/>
+              </a:solidFill>
+            </a:ln>
+          </p:spPr>
+          <p:style>
+            <a:lnRef idx="2">
+              <a:schemeClr val="accent1">
+                <a:shade val="50000"/>
+              </a:schemeClr>
+            </a:lnRef>
+            <a:fillRef idx="1">
+              <a:schemeClr val="accent1"/>
+            </a:fillRef>
+            <a:effectRef idx="0">
+              <a:schemeClr val="accent1"/>
+            </a:effectRef>
+            <a:fontRef idx="minor">
+              <a:schemeClr val="lt1"/>
+            </a:fontRef>
+          </p:style>
+          <p:txBody>
+            <a:bodyPr rtlCol="0" anchor="ctr"/>
+            <a:lstStyle/>
+            <a:p>
+              <a:pPr algn="ctr"/>
+              <a:endParaRPr lang="en-CA"/>
+            </a:p>
+          </p:txBody>
+        </p:sp>
+        <p:sp>
+          <p:nvSpPr>
+            <p:cNvPr id="42" name="Oval 41">
+              <a:extLst>
+                <a:ext uri="{FF2B5EF4-FFF2-40B4-BE49-F238E27FC236}">
+                  <a16:creationId xmlns:a16="http://schemas.microsoft.com/office/drawing/2014/main" id="{C9F40FAA-C19D-468E-9D08-50108E2B24D2}"/>
+                </a:ext>
+              </a:extLst>
+            </p:cNvPr>
+            <p:cNvSpPr/>
+            <p:nvPr/>
+          </p:nvSpPr>
+          <p:spPr>
+            <a:xfrm>
+              <a:off x="3643012" y="1772598"/>
+              <a:ext cx="54000" cy="54000"/>
+            </a:xfrm>
+            <a:prstGeom prst="ellipse">
+              <a:avLst/>
+            </a:prstGeom>
+            <a:solidFill>
+              <a:schemeClr val="tx1"/>
+            </a:solidFill>
+            <a:ln>
+              <a:solidFill>
+                <a:schemeClr val="tx1"/>
+              </a:solidFill>
+            </a:ln>
+          </p:spPr>
+          <p:style>
+            <a:lnRef idx="2">
+              <a:schemeClr val="accent1">
+                <a:shade val="50000"/>
+              </a:schemeClr>
+            </a:lnRef>
+            <a:fillRef idx="1">
+              <a:schemeClr val="accent1"/>
+            </a:fillRef>
+            <a:effectRef idx="0">
+              <a:schemeClr val="accent1"/>
+            </a:effectRef>
+            <a:fontRef idx="minor">
+              <a:schemeClr val="lt1"/>
+            </a:fontRef>
+          </p:style>
+          <p:txBody>
+            <a:bodyPr rtlCol="0" anchor="ctr"/>
+            <a:lstStyle/>
+            <a:p>
+              <a:pPr algn="ctr"/>
+              <a:endParaRPr lang="en-CA"/>
+            </a:p>
+          </p:txBody>
+        </p:sp>
+        <p:sp>
+          <p:nvSpPr>
+            <p:cNvPr id="43" name="Oval 42">
+              <a:extLst>
+                <a:ext uri="{FF2B5EF4-FFF2-40B4-BE49-F238E27FC236}">
+                  <a16:creationId xmlns:a16="http://schemas.microsoft.com/office/drawing/2014/main" id="{51DD2874-43C2-4155-9E71-984CA074E166}"/>
+                </a:ext>
+              </a:extLst>
+            </p:cNvPr>
+            <p:cNvSpPr/>
+            <p:nvPr/>
+          </p:nvSpPr>
+          <p:spPr>
+            <a:xfrm>
+              <a:off x="3296104" y="1621518"/>
+              <a:ext cx="54000" cy="54000"/>
+            </a:xfrm>
+            <a:prstGeom prst="ellipse">
+              <a:avLst/>
+            </a:prstGeom>
+            <a:solidFill>
+              <a:schemeClr val="tx1"/>
+            </a:solidFill>
+            <a:ln>
+              <a:solidFill>
+                <a:schemeClr val="tx1"/>
+              </a:solidFill>
+            </a:ln>
+          </p:spPr>
+          <p:style>
+            <a:lnRef idx="2">
+              <a:schemeClr val="accent1">
+                <a:shade val="50000"/>
+              </a:schemeClr>
+            </a:lnRef>
+            <a:fillRef idx="1">
+              <a:schemeClr val="accent1"/>
+            </a:fillRef>
+            <a:effectRef idx="0">
+              <a:schemeClr val="accent1"/>
+            </a:effectRef>
+            <a:fontRef idx="minor">
+              <a:schemeClr val="lt1"/>
+            </a:fontRef>
+          </p:style>
+          <p:txBody>
+            <a:bodyPr rtlCol="0" anchor="ctr"/>
+            <a:lstStyle/>
+            <a:p>
+              <a:pPr algn="ctr"/>
+              <a:endParaRPr lang="en-CA"/>
+            </a:p>
+          </p:txBody>
+        </p:sp>
+        <p:sp>
+          <p:nvSpPr>
+            <p:cNvPr id="44" name="Oval 43">
+              <a:extLst>
+                <a:ext uri="{FF2B5EF4-FFF2-40B4-BE49-F238E27FC236}">
+                  <a16:creationId xmlns:a16="http://schemas.microsoft.com/office/drawing/2014/main" id="{C76B5F56-48D9-416C-BE11-71BCBB9F41B5}"/>
+                </a:ext>
+              </a:extLst>
+            </p:cNvPr>
+            <p:cNvSpPr/>
+            <p:nvPr/>
+          </p:nvSpPr>
+          <p:spPr>
+            <a:xfrm>
+              <a:off x="3026229" y="1535793"/>
+              <a:ext cx="54000" cy="54000"/>
+            </a:xfrm>
+            <a:prstGeom prst="ellipse">
+              <a:avLst/>
+            </a:prstGeom>
+            <a:solidFill>
+              <a:schemeClr val="tx1"/>
+            </a:solidFill>
+            <a:ln>
+              <a:solidFill>
+                <a:schemeClr val="tx1"/>
+              </a:solidFill>
+            </a:ln>
+          </p:spPr>
+          <p:style>
+            <a:lnRef idx="2">
+              <a:schemeClr val="accent1">
+                <a:shade val="50000"/>
+              </a:schemeClr>
+            </a:lnRef>
+            <a:fillRef idx="1">
+              <a:schemeClr val="accent1"/>
+            </a:fillRef>
+            <a:effectRef idx="0">
+              <a:schemeClr val="accent1"/>
+            </a:effectRef>
+            <a:fontRef idx="minor">
+              <a:schemeClr val="lt1"/>
+            </a:fontRef>
+          </p:style>
+          <p:txBody>
+            <a:bodyPr rtlCol="0" anchor="ctr"/>
+            <a:lstStyle/>
+            <a:p>
+              <a:pPr algn="ctr"/>
+              <a:endParaRPr lang="en-CA"/>
+            </a:p>
+          </p:txBody>
+        </p:sp>
+      </p:grpSp>
+      <p:grpSp>
+        <p:nvGrpSpPr>
+          <p:cNvPr id="45" name="Group 44">
+            <a:extLst>
+              <a:ext uri="{FF2B5EF4-FFF2-40B4-BE49-F238E27FC236}">
+                <a16:creationId xmlns:a16="http://schemas.microsoft.com/office/drawing/2014/main" id="{4BCCE2DC-14B3-429C-9E71-FE5128310EA2}"/>
+              </a:ext>
+            </a:extLst>
+          </p:cNvPr>
+          <p:cNvGrpSpPr/>
+          <p:nvPr/>
+        </p:nvGrpSpPr>
+        <p:grpSpPr>
+          <a:xfrm>
+            <a:off x="5563581" y="783407"/>
+            <a:ext cx="4336967" cy="3505199"/>
+            <a:chOff x="5209542" y="828675"/>
+            <a:chExt cx="2806971" cy="2771775"/>
+          </a:xfrm>
+        </p:grpSpPr>
+        <p:cxnSp>
+          <p:nvCxnSpPr>
+            <p:cNvPr id="46" name="Straight Connector 45">
+              <a:extLst>
+                <a:ext uri="{FF2B5EF4-FFF2-40B4-BE49-F238E27FC236}">
+                  <a16:creationId xmlns:a16="http://schemas.microsoft.com/office/drawing/2014/main" id="{552C82E9-9425-487A-B00A-2F7E8E3E4573}"/>
+                </a:ext>
+              </a:extLst>
+            </p:cNvPr>
+            <p:cNvCxnSpPr>
+              <a:cxnSpLocks/>
+            </p:cNvCxnSpPr>
+            <p:nvPr/>
+          </p:nvCxnSpPr>
+          <p:spPr>
+            <a:xfrm>
+              <a:off x="5381625" y="828675"/>
+              <a:ext cx="0" cy="2771775"/>
+            </a:xfrm>
+            <a:prstGeom prst="line">
+              <a:avLst/>
+            </a:prstGeom>
+            <a:ln w="25400">
+              <a:solidFill>
+                <a:schemeClr val="tx1"/>
+              </a:solidFill>
+            </a:ln>
+          </p:spPr>
+          <p:style>
+            <a:lnRef idx="1">
+              <a:schemeClr val="accent1"/>
+            </a:lnRef>
+            <a:fillRef idx="0">
+              <a:schemeClr val="accent1"/>
+            </a:fillRef>
+            <a:effectRef idx="0">
+              <a:schemeClr val="accent1"/>
+            </a:effectRef>
+            <a:fontRef idx="minor">
+              <a:schemeClr val="tx1"/>
+            </a:fontRef>
+          </p:style>
+        </p:cxnSp>
+        <p:cxnSp>
+          <p:nvCxnSpPr>
+            <p:cNvPr id="47" name="Straight Connector 46">
+              <a:extLst>
+                <a:ext uri="{FF2B5EF4-FFF2-40B4-BE49-F238E27FC236}">
+                  <a16:creationId xmlns:a16="http://schemas.microsoft.com/office/drawing/2014/main" id="{B185A007-406B-4C31-A2DD-35AD38F5E3C7}"/>
+                </a:ext>
+              </a:extLst>
+            </p:cNvPr>
+            <p:cNvCxnSpPr>
+              <a:cxnSpLocks/>
+            </p:cNvCxnSpPr>
+            <p:nvPr/>
+          </p:nvCxnSpPr>
+          <p:spPr>
+            <a:xfrm flipH="1">
+              <a:off x="5209542" y="3429000"/>
+              <a:ext cx="2806971" cy="0"/>
+            </a:xfrm>
+            <a:prstGeom prst="line">
+              <a:avLst/>
+            </a:prstGeom>
+            <a:ln w="25400">
+              <a:solidFill>
+                <a:schemeClr val="tx1"/>
+              </a:solidFill>
+            </a:ln>
+          </p:spPr>
+          <p:style>
+            <a:lnRef idx="1">
+              <a:schemeClr val="accent1"/>
+            </a:lnRef>
+            <a:fillRef idx="0">
+              <a:schemeClr val="accent1"/>
+            </a:fillRef>
+            <a:effectRef idx="0">
+              <a:schemeClr val="accent1"/>
+            </a:effectRef>
+            <a:fontRef idx="minor">
+              <a:schemeClr val="tx1"/>
+            </a:fontRef>
+          </p:style>
+        </p:cxnSp>
+      </p:grpSp>
+      <p:sp>
+        <p:nvSpPr>
+          <p:cNvPr id="49" name="TextBox 48">
+            <a:extLst>
+              <a:ext uri="{FF2B5EF4-FFF2-40B4-BE49-F238E27FC236}">
+                <a16:creationId xmlns:a16="http://schemas.microsoft.com/office/drawing/2014/main" id="{24A7F801-888A-401E-BAD8-52132F0085B7}"/>
+              </a:ext>
+            </a:extLst>
+          </p:cNvPr>
+          <p:cNvSpPr txBox="1"/>
+          <p:nvPr/>
+        </p:nvSpPr>
+        <p:spPr>
+          <a:xfrm>
+            <a:off x="9958912" y="3871519"/>
+            <a:ext cx="268512" cy="369332"/>
+          </a:xfrm>
+          <a:prstGeom prst="rect">
+            <a:avLst/>
+          </a:prstGeom>
+          <a:noFill/>
+        </p:spPr>
+        <p:txBody>
+          <a:bodyPr wrap="square" rtlCol="0">
+            <a:spAutoFit/>
+          </a:bodyPr>
+          <a:lstStyle/>
+          <a:p>
+            <a:r>
+              <a:rPr lang="en-CA" i="1" dirty="0"/>
+              <a:t>x</a:t>
+            </a:r>
+          </a:p>
+        </p:txBody>
+      </p:sp>
+      <p:sp>
+        <p:nvSpPr>
+          <p:cNvPr id="50" name="TextBox 49">
+            <a:extLst>
+              <a:ext uri="{FF2B5EF4-FFF2-40B4-BE49-F238E27FC236}">
+                <a16:creationId xmlns:a16="http://schemas.microsoft.com/office/drawing/2014/main" id="{2FA75FE3-D7AF-46B7-AB70-A5145A1A23EB}"/>
+              </a:ext>
+            </a:extLst>
+          </p:cNvPr>
+          <p:cNvSpPr txBox="1"/>
+          <p:nvPr/>
+        </p:nvSpPr>
+        <p:spPr>
+          <a:xfrm>
+            <a:off x="5695205" y="398584"/>
+            <a:ext cx="268512" cy="369332"/>
+          </a:xfrm>
+          <a:prstGeom prst="rect">
+            <a:avLst/>
+          </a:prstGeom>
+          <a:noFill/>
+        </p:spPr>
+        <p:txBody>
+          <a:bodyPr wrap="square" rtlCol="0">
+            <a:spAutoFit/>
+          </a:bodyPr>
+          <a:lstStyle/>
+          <a:p>
+            <a:r>
+              <a:rPr lang="en-CA" i="1" dirty="0"/>
+              <a:t>y</a:t>
+            </a:r>
+          </a:p>
+        </p:txBody>
+      </p:sp>
+      <p:cxnSp>
+        <p:nvCxnSpPr>
+          <p:cNvPr id="51" name="Straight Connector 50">
+            <a:extLst>
+              <a:ext uri="{FF2B5EF4-FFF2-40B4-BE49-F238E27FC236}">
+                <a16:creationId xmlns:a16="http://schemas.microsoft.com/office/drawing/2014/main" id="{E18022D1-B3B3-47FF-AAF7-EF88393579B6}"/>
+              </a:ext>
+            </a:extLst>
+          </p:cNvPr>
+          <p:cNvCxnSpPr>
+            <a:cxnSpLocks/>
+          </p:cNvCxnSpPr>
+          <p:nvPr/>
+        </p:nvCxnSpPr>
+        <p:spPr>
+          <a:xfrm flipH="1">
+            <a:off x="5839073" y="3280131"/>
+            <a:ext cx="538115" cy="801060"/>
+          </a:xfrm>
+          <a:prstGeom prst="line">
+            <a:avLst/>
+          </a:prstGeom>
+          <a:ln w="44450">
+            <a:solidFill>
+              <a:schemeClr val="tx1"/>
+            </a:solidFill>
+            <a:headEnd type="triangle" w="med" len="med"/>
+            <a:tailEnd type="none" w="med" len="med"/>
+          </a:ln>
+        </p:spPr>
+        <p:style>
+          <a:lnRef idx="1">
+            <a:schemeClr val="accent1"/>
+          </a:lnRef>
+          <a:fillRef idx="0">
+            <a:schemeClr val="accent1"/>
+          </a:fillRef>
+          <a:effectRef idx="0">
+            <a:schemeClr val="accent1"/>
+          </a:effectRef>
+          <a:fontRef idx="minor">
+            <a:schemeClr val="tx1"/>
+          </a:fontRef>
+        </p:style>
+      </p:cxnSp>
+      <p:cxnSp>
+        <p:nvCxnSpPr>
+          <p:cNvPr id="52" name="Straight Connector 51">
+            <a:extLst>
+              <a:ext uri="{FF2B5EF4-FFF2-40B4-BE49-F238E27FC236}">
+                <a16:creationId xmlns:a16="http://schemas.microsoft.com/office/drawing/2014/main" id="{7C3B5AD9-8EEB-484C-BF3E-68F24C1925BC}"/>
+              </a:ext>
+            </a:extLst>
+          </p:cNvPr>
+          <p:cNvCxnSpPr>
+            <a:cxnSpLocks/>
+            <a:stCxn id="36" idx="3"/>
+          </p:cNvCxnSpPr>
+          <p:nvPr/>
+        </p:nvCxnSpPr>
+        <p:spPr>
+          <a:xfrm flipH="1">
+            <a:off x="5845764" y="2520808"/>
+            <a:ext cx="1751414" cy="1534739"/>
+          </a:xfrm>
+          <a:prstGeom prst="line">
+            <a:avLst/>
+          </a:prstGeom>
+          <a:ln w="44450">
+            <a:solidFill>
+              <a:schemeClr val="tx1"/>
+            </a:solidFill>
+            <a:headEnd type="triangle" w="med" len="med"/>
+            <a:tailEnd type="none" w="med" len="med"/>
+          </a:ln>
+        </p:spPr>
+        <p:style>
+          <a:lnRef idx="1">
+            <a:schemeClr val="accent1"/>
+          </a:lnRef>
+          <a:fillRef idx="0">
+            <a:schemeClr val="accent1"/>
+          </a:fillRef>
+          <a:effectRef idx="0">
+            <a:schemeClr val="accent1"/>
+          </a:effectRef>
+          <a:fontRef idx="minor">
+            <a:schemeClr val="tx1"/>
+          </a:fontRef>
+        </p:style>
+      </p:cxnSp>
+      <p:cxnSp>
+        <p:nvCxnSpPr>
+          <p:cNvPr id="53" name="Straight Connector 52">
+            <a:extLst>
+              <a:ext uri="{FF2B5EF4-FFF2-40B4-BE49-F238E27FC236}">
+                <a16:creationId xmlns:a16="http://schemas.microsoft.com/office/drawing/2014/main" id="{3C73C3E1-5180-4BA3-A846-46F64EB2FC4E}"/>
+              </a:ext>
+            </a:extLst>
+          </p:cNvPr>
+          <p:cNvCxnSpPr>
+            <a:cxnSpLocks/>
+            <a:stCxn id="39" idx="1"/>
+          </p:cNvCxnSpPr>
+          <p:nvPr/>
+        </p:nvCxnSpPr>
+        <p:spPr>
+          <a:xfrm flipH="1">
+            <a:off x="5829461" y="2796283"/>
+            <a:ext cx="2914358" cy="1259264"/>
+          </a:xfrm>
+          <a:prstGeom prst="line">
+            <a:avLst/>
+          </a:prstGeom>
+          <a:ln w="44450">
+            <a:solidFill>
+              <a:schemeClr val="tx1"/>
+            </a:solidFill>
+            <a:headEnd type="triangle" w="med" len="med"/>
+            <a:tailEnd type="none" w="med" len="med"/>
+          </a:ln>
+        </p:spPr>
+        <p:style>
+          <a:lnRef idx="1">
+            <a:schemeClr val="accent1"/>
+          </a:lnRef>
+          <a:fillRef idx="0">
+            <a:schemeClr val="accent1"/>
+          </a:fillRef>
+          <a:effectRef idx="0">
+            <a:schemeClr val="accent1"/>
+          </a:effectRef>
+          <a:fontRef idx="minor">
+            <a:schemeClr val="tx1"/>
+          </a:fontRef>
+        </p:style>
+      </p:cxnSp>
+      <p:sp>
+        <p:nvSpPr>
+          <p:cNvPr id="58" name="TextBox 57">
+            <a:extLst>
+              <a:ext uri="{FF2B5EF4-FFF2-40B4-BE49-F238E27FC236}">
+                <a16:creationId xmlns:a16="http://schemas.microsoft.com/office/drawing/2014/main" id="{DC97E907-52B5-4DE5-A5A5-40B854F4516D}"/>
+              </a:ext>
+            </a:extLst>
+          </p:cNvPr>
+          <p:cNvSpPr txBox="1"/>
+          <p:nvPr/>
+        </p:nvSpPr>
+        <p:spPr>
+          <a:xfrm>
+            <a:off x="5991382" y="2904445"/>
+            <a:ext cx="690352" cy="338554"/>
+          </a:xfrm>
+          <a:prstGeom prst="rect">
+            <a:avLst/>
+          </a:prstGeom>
+          <a:noFill/>
+        </p:spPr>
+        <p:txBody>
+          <a:bodyPr wrap="square" rtlCol="0">
+            <a:spAutoFit/>
+          </a:bodyPr>
+          <a:lstStyle/>
+          <a:p>
+            <a:r>
+              <a:rPr lang="en-CA" sz="1600" i="1" dirty="0"/>
+              <a:t>s = 1</a:t>
+            </a:r>
+          </a:p>
+        </p:txBody>
+      </p:sp>
+      <p:sp>
+        <p:nvSpPr>
+          <p:cNvPr id="59" name="TextBox 58">
+            <a:extLst>
+              <a:ext uri="{FF2B5EF4-FFF2-40B4-BE49-F238E27FC236}">
+                <a16:creationId xmlns:a16="http://schemas.microsoft.com/office/drawing/2014/main" id="{9003EB8F-6B85-4BC2-920D-27A19651C758}"/>
+              </a:ext>
+            </a:extLst>
+          </p:cNvPr>
+          <p:cNvSpPr txBox="1"/>
+          <p:nvPr/>
+        </p:nvSpPr>
+        <p:spPr>
+          <a:xfrm>
+            <a:off x="7401176" y="2110088"/>
+            <a:ext cx="690352" cy="338554"/>
+          </a:xfrm>
+          <a:prstGeom prst="rect">
+            <a:avLst/>
+          </a:prstGeom>
+          <a:noFill/>
+        </p:spPr>
+        <p:txBody>
+          <a:bodyPr wrap="square" rtlCol="0">
+            <a:spAutoFit/>
+          </a:bodyPr>
+          <a:lstStyle/>
+          <a:p>
+            <a:r>
+              <a:rPr lang="en-CA" sz="1600" i="1" dirty="0"/>
+              <a:t>s = 4</a:t>
+            </a:r>
+          </a:p>
+        </p:txBody>
+      </p:sp>
+      <p:sp>
+        <p:nvSpPr>
+          <p:cNvPr id="60" name="TextBox 59">
+            <a:extLst>
+              <a:ext uri="{FF2B5EF4-FFF2-40B4-BE49-F238E27FC236}">
+                <a16:creationId xmlns:a16="http://schemas.microsoft.com/office/drawing/2014/main" id="{EDE20925-1959-4C11-895E-4B530CE62440}"/>
+              </a:ext>
+            </a:extLst>
+          </p:cNvPr>
+          <p:cNvSpPr txBox="1"/>
+          <p:nvPr/>
+        </p:nvSpPr>
+        <p:spPr>
+          <a:xfrm>
+            <a:off x="8796665" y="2482963"/>
+            <a:ext cx="690352" cy="338554"/>
+          </a:xfrm>
+          <a:prstGeom prst="rect">
+            <a:avLst/>
+          </a:prstGeom>
+          <a:noFill/>
+        </p:spPr>
+        <p:txBody>
+          <a:bodyPr wrap="square" rtlCol="0">
+            <a:spAutoFit/>
+          </a:bodyPr>
+          <a:lstStyle/>
+          <a:p>
+            <a:r>
+              <a:rPr lang="en-CA" sz="1600" i="1" dirty="0"/>
+              <a:t>s = 6</a:t>
+            </a:r>
+          </a:p>
+        </p:txBody>
+      </p:sp>
+      <mc:AlternateContent xmlns:mc="http://schemas.openxmlformats.org/markup-compatibility/2006">
+        <mc:Choice xmlns:a14="http://schemas.microsoft.com/office/drawing/2010/main" Requires="a14">
+          <p:sp>
+            <p:nvSpPr>
+              <p:cNvPr id="61" name="Rectangle 60">
+                <a:extLst>
+                  <a:ext uri="{FF2B5EF4-FFF2-40B4-BE49-F238E27FC236}">
+                    <a16:creationId xmlns:a16="http://schemas.microsoft.com/office/drawing/2014/main" id="{E80E9DBB-2393-4917-B455-9DB4BBE8BA78}"/>
+                  </a:ext>
+                </a:extLst>
+              </p:cNvPr>
+              <p:cNvSpPr/>
+              <p:nvPr/>
+            </p:nvSpPr>
+            <p:spPr>
+              <a:xfrm>
+                <a:off x="7955372" y="867919"/>
+                <a:ext cx="2314608" cy="561949"/>
+              </a:xfrm>
+              <a:prstGeom prst="rect">
+                <a:avLst/>
+              </a:prstGeom>
+            </p:spPr>
+            <p:txBody>
+              <a:bodyPr wrap="none">
+                <a:spAutoFit/>
+              </a:bodyPr>
+              <a:lstStyle/>
+              <a:p>
+                <a:pPr>
+                  <a:lnSpc>
+                    <a:spcPct val="200000"/>
+                  </a:lnSpc>
+                  <a:spcBef>
+                    <a:spcPts val="180"/>
+                  </a:spcBef>
+                  <a:spcAft>
+                    <a:spcPts val="180"/>
+                  </a:spcAft>
+                </a:pPr>
+                <a14:m>
+                  <m:oMath xmlns:m="http://schemas.openxmlformats.org/officeDocument/2006/math">
+                    <m:bar>
+                      <m:barPr>
+                        <m:pos m:val="top"/>
+                        <m:ctrlPr>
+                          <a:rPr lang="en-CA" i="1">
+                            <a:latin typeface="Cambria Math" panose="02040503050406030204" pitchFamily="18" charset="0"/>
+                            <a:ea typeface="Times New Roman" panose="02020603050405020304" pitchFamily="18" charset="0"/>
+                          </a:rPr>
+                        </m:ctrlPr>
+                      </m:barPr>
+                      <m:e>
+                        <m:r>
+                          <a:rPr lang="en-US" b="1" i="1">
+                            <a:latin typeface="Cambria Math" panose="02040503050406030204" pitchFamily="18" charset="0"/>
+                            <a:ea typeface="Times New Roman" panose="02020603050405020304" pitchFamily="18" charset="0"/>
+                          </a:rPr>
+                          <m:t>𝐫</m:t>
+                        </m:r>
+                      </m:e>
+                    </m:bar>
+                    <m:r>
+                      <a:rPr lang="en-US" i="1">
+                        <a:latin typeface="Cambria Math" panose="02040503050406030204" pitchFamily="18" charset="0"/>
+                        <a:ea typeface="Times New Roman" panose="02020603050405020304" pitchFamily="18" charset="0"/>
+                      </a:rPr>
+                      <m:t>(</m:t>
+                    </m:r>
+                    <m:r>
+                      <a:rPr lang="en-US" i="1">
+                        <a:latin typeface="Cambria Math" panose="02040503050406030204" pitchFamily="18" charset="0"/>
+                        <a:ea typeface="Times New Roman" panose="02020603050405020304" pitchFamily="18" charset="0"/>
+                      </a:rPr>
+                      <m:t>𝑠</m:t>
+                    </m:r>
+                    <m:r>
+                      <a:rPr lang="en-US" i="1">
+                        <a:latin typeface="Cambria Math" panose="02040503050406030204" pitchFamily="18" charset="0"/>
+                        <a:ea typeface="Times New Roman" panose="02020603050405020304" pitchFamily="18" charset="0"/>
+                      </a:rPr>
+                      <m:t>)=</m:t>
+                    </m:r>
+                    <m:bar>
+                      <m:barPr>
+                        <m:pos m:val="top"/>
+                        <m:ctrlPr>
+                          <a:rPr lang="en-CA" i="1">
+                            <a:latin typeface="Cambria Math" panose="02040503050406030204" pitchFamily="18" charset="0"/>
+                            <a:ea typeface="Times New Roman" panose="02020603050405020304" pitchFamily="18" charset="0"/>
+                          </a:rPr>
+                        </m:ctrlPr>
+                      </m:barPr>
+                      <m:e>
+                        <m:r>
+                          <a:rPr lang="en-US" i="1">
+                            <a:latin typeface="Cambria Math" panose="02040503050406030204" pitchFamily="18" charset="0"/>
+                            <a:ea typeface="Times New Roman" panose="02020603050405020304" pitchFamily="18" charset="0"/>
+                          </a:rPr>
+                          <m:t>𝑥</m:t>
+                        </m:r>
+                      </m:e>
+                    </m:bar>
+                    <m:r>
+                      <a:rPr lang="en-US" i="1">
+                        <a:latin typeface="Cambria Math" panose="02040503050406030204" pitchFamily="18" charset="0"/>
+                        <a:ea typeface="Times New Roman" panose="02020603050405020304" pitchFamily="18" charset="0"/>
+                      </a:rPr>
+                      <m:t>(</m:t>
+                    </m:r>
+                    <m:r>
+                      <a:rPr lang="en-US" i="1">
+                        <a:latin typeface="Cambria Math" panose="02040503050406030204" pitchFamily="18" charset="0"/>
+                        <a:ea typeface="Times New Roman" panose="02020603050405020304" pitchFamily="18" charset="0"/>
+                      </a:rPr>
+                      <m:t>𝑠</m:t>
+                    </m:r>
+                    <m:r>
+                      <a:rPr lang="en-US" i="1">
+                        <a:latin typeface="Cambria Math" panose="02040503050406030204" pitchFamily="18" charset="0"/>
+                        <a:ea typeface="Times New Roman" panose="02020603050405020304" pitchFamily="18" charset="0"/>
+                      </a:rPr>
+                      <m:t>)</m:t>
+                    </m:r>
+                    <m:r>
+                      <a:rPr lang="en-US" b="1" i="1">
+                        <a:latin typeface="Cambria Math" panose="02040503050406030204" pitchFamily="18" charset="0"/>
+                        <a:ea typeface="Times New Roman" panose="02020603050405020304" pitchFamily="18" charset="0"/>
+                      </a:rPr>
+                      <m:t>𝐢</m:t>
+                    </m:r>
+                    <m:r>
+                      <a:rPr lang="en-US" i="1">
+                        <a:latin typeface="Cambria Math" panose="02040503050406030204" pitchFamily="18" charset="0"/>
+                        <a:ea typeface="Times New Roman" panose="02020603050405020304" pitchFamily="18" charset="0"/>
+                      </a:rPr>
+                      <m:t>+</m:t>
+                    </m:r>
+                    <m:bar>
+                      <m:barPr>
+                        <m:pos m:val="top"/>
+                        <m:ctrlPr>
+                          <a:rPr lang="en-CA" i="1">
+                            <a:latin typeface="Cambria Math" panose="02040503050406030204" pitchFamily="18" charset="0"/>
+                            <a:ea typeface="Times New Roman" panose="02020603050405020304" pitchFamily="18" charset="0"/>
+                          </a:rPr>
+                        </m:ctrlPr>
+                      </m:barPr>
+                      <m:e>
+                        <m:r>
+                          <a:rPr lang="en-US" i="1">
+                            <a:latin typeface="Cambria Math" panose="02040503050406030204" pitchFamily="18" charset="0"/>
+                            <a:ea typeface="Times New Roman" panose="02020603050405020304" pitchFamily="18" charset="0"/>
+                          </a:rPr>
+                          <m:t>𝑦</m:t>
+                        </m:r>
+                      </m:e>
+                    </m:bar>
+                    <m:r>
+                      <a:rPr lang="en-US" i="1">
+                        <a:latin typeface="Cambria Math" panose="02040503050406030204" pitchFamily="18" charset="0"/>
+                        <a:ea typeface="Times New Roman" panose="02020603050405020304" pitchFamily="18" charset="0"/>
+                      </a:rPr>
+                      <m:t>(</m:t>
+                    </m:r>
+                    <m:r>
+                      <a:rPr lang="en-US" i="1">
+                        <a:latin typeface="Cambria Math" panose="02040503050406030204" pitchFamily="18" charset="0"/>
+                        <a:ea typeface="Times New Roman" panose="02020603050405020304" pitchFamily="18" charset="0"/>
+                      </a:rPr>
+                      <m:t>𝑠</m:t>
+                    </m:r>
+                    <m:r>
+                      <a:rPr lang="en-US" i="1">
+                        <a:latin typeface="Cambria Math" panose="02040503050406030204" pitchFamily="18" charset="0"/>
+                        <a:ea typeface="Times New Roman" panose="02020603050405020304" pitchFamily="18" charset="0"/>
+                      </a:rPr>
+                      <m:t>)</m:t>
+                    </m:r>
+                    <m:r>
+                      <a:rPr lang="en-US" b="1" i="1">
+                        <a:latin typeface="Cambria Math" panose="02040503050406030204" pitchFamily="18" charset="0"/>
+                        <a:ea typeface="Times New Roman" panose="02020603050405020304" pitchFamily="18" charset="0"/>
+                      </a:rPr>
+                      <m:t>𝐣</m:t>
+                    </m:r>
+                  </m:oMath>
+                </a14:m>
+                <a:r>
+                  <a:rPr lang="en-US" dirty="0">
+                    <a:latin typeface="Times New Roman" panose="02020603050405020304" pitchFamily="18" charset="0"/>
+                    <a:ea typeface="Times New Roman" panose="02020603050405020304" pitchFamily="18" charset="0"/>
+                  </a:rPr>
+                  <a:t> </a:t>
+                </a:r>
+                <a:endParaRPr lang="en-CA" dirty="0">
+                  <a:latin typeface="Times New Roman" panose="02020603050405020304" pitchFamily="18" charset="0"/>
+                  <a:ea typeface="Times New Roman" panose="02020603050405020304" pitchFamily="18" charset="0"/>
+                </a:endParaRPr>
+              </a:p>
+            </p:txBody>
+          </p:sp>
+        </mc:Choice>
+        <mc:Fallback>
+          <p:sp>
+            <p:nvSpPr>
+              <p:cNvPr id="61" name="Rectangle 60">
+                <a:extLst>
+                  <a:ext uri="{FF2B5EF4-FFF2-40B4-BE49-F238E27FC236}">
+                    <a16:creationId xmlns:a16="http://schemas.microsoft.com/office/drawing/2014/main" id="{E80E9DBB-2393-4917-B455-9DB4BBE8BA78}"/>
+                  </a:ext>
+                </a:extLst>
+              </p:cNvPr>
+              <p:cNvSpPr>
+                <a:spLocks noRot="1" noChangeAspect="1" noMove="1" noResize="1" noEditPoints="1" noAdjustHandles="1" noChangeArrowheads="1" noChangeShapeType="1" noTextEdit="1"/>
+              </p:cNvSpPr>
+              <p:nvPr/>
+            </p:nvSpPr>
+            <p:spPr>
+              <a:xfrm>
+                <a:off x="7955372" y="867919"/>
+                <a:ext cx="2314608" cy="561949"/>
+              </a:xfrm>
+              <a:prstGeom prst="rect">
+                <a:avLst/>
+              </a:prstGeom>
+              <a:blipFill>
+                <a:blip r:embed="rId3"/>
+                <a:stretch>
+                  <a:fillRect b="-9677"/>
+                </a:stretch>
+              </a:blipFill>
+            </p:spPr>
+            <p:txBody>
+              <a:bodyPr/>
+              <a:lstStyle/>
+              <a:p>
+                <a:r>
+                  <a:rPr lang="en-CA">
+                    <a:noFill/>
+                  </a:rPr>
+                  <a:t> </a:t>
+                </a:r>
+              </a:p>
+            </p:txBody>
+          </p:sp>
+        </mc:Fallback>
+      </mc:AlternateContent>
+    </p:spTree>
+    <p:extLst>
+      <p:ext uri="{BB962C8B-B14F-4D97-AF65-F5344CB8AC3E}">
+        <p14:creationId xmlns:p14="http://schemas.microsoft.com/office/powerpoint/2010/main" val="2232505287"/>
       </p:ext>
     </p:extLst>
   </p:cSld>

</xml_diff>